<commit_message>
Atualizacao dos artefatos do 15 ao 20
</commit_message>
<xml_diff>
--- a/Artefatos/16. Diagramas de Fluxo de Dados.pptx
+++ b/Artefatos/16. Diagramas de Fluxo de Dados.pptx
@@ -307,7 +307,7 @@
           <a:p>
             <a:fld id="{4DBD1E3A-4E22-4317-B6F0-1BA28CFB09D2}" type="datetimeFigureOut">
               <a:rPr lang="pt-BR" smtClean="0"/>
-              <a:t>28/04/2020</a:t>
+              <a:t>29/04/2020</a:t>
             </a:fld>
             <a:endParaRPr lang="pt-BR"/>
           </a:p>
@@ -477,7 +477,7 @@
           <a:p>
             <a:fld id="{4DBD1E3A-4E22-4317-B6F0-1BA28CFB09D2}" type="datetimeFigureOut">
               <a:rPr lang="pt-BR" smtClean="0"/>
-              <a:t>28/04/2020</a:t>
+              <a:t>29/04/2020</a:t>
             </a:fld>
             <a:endParaRPr lang="pt-BR"/>
           </a:p>
@@ -657,7 +657,7 @@
           <a:p>
             <a:fld id="{4DBD1E3A-4E22-4317-B6F0-1BA28CFB09D2}" type="datetimeFigureOut">
               <a:rPr lang="pt-BR" smtClean="0"/>
-              <a:t>28/04/2020</a:t>
+              <a:t>29/04/2020</a:t>
             </a:fld>
             <a:endParaRPr lang="pt-BR"/>
           </a:p>
@@ -849,7 +849,7 @@
           <a:p>
             <a:fld id="{4DBD1E3A-4E22-4317-B6F0-1BA28CFB09D2}" type="datetimeFigureOut">
               <a:rPr lang="pt-BR" smtClean="0"/>
-              <a:t>28/04/2020</a:t>
+              <a:t>29/04/2020</a:t>
             </a:fld>
             <a:endParaRPr lang="pt-BR"/>
           </a:p>
@@ -1019,7 +1019,7 @@
           <a:p>
             <a:fld id="{4DBD1E3A-4E22-4317-B6F0-1BA28CFB09D2}" type="datetimeFigureOut">
               <a:rPr lang="pt-BR" smtClean="0"/>
-              <a:t>28/04/2020</a:t>
+              <a:t>29/04/2020</a:t>
             </a:fld>
             <a:endParaRPr lang="pt-BR"/>
           </a:p>
@@ -1265,7 +1265,7 @@
           <a:p>
             <a:fld id="{4DBD1E3A-4E22-4317-B6F0-1BA28CFB09D2}" type="datetimeFigureOut">
               <a:rPr lang="pt-BR" smtClean="0"/>
-              <a:t>28/04/2020</a:t>
+              <a:t>29/04/2020</a:t>
             </a:fld>
             <a:endParaRPr lang="pt-BR"/>
           </a:p>
@@ -1497,7 +1497,7 @@
           <a:p>
             <a:fld id="{4DBD1E3A-4E22-4317-B6F0-1BA28CFB09D2}" type="datetimeFigureOut">
               <a:rPr lang="pt-BR" smtClean="0"/>
-              <a:t>28/04/2020</a:t>
+              <a:t>29/04/2020</a:t>
             </a:fld>
             <a:endParaRPr lang="pt-BR"/>
           </a:p>
@@ -1864,7 +1864,7 @@
           <a:p>
             <a:fld id="{4DBD1E3A-4E22-4317-B6F0-1BA28CFB09D2}" type="datetimeFigureOut">
               <a:rPr lang="pt-BR" smtClean="0"/>
-              <a:t>28/04/2020</a:t>
+              <a:t>29/04/2020</a:t>
             </a:fld>
             <a:endParaRPr lang="pt-BR"/>
           </a:p>
@@ -1982,7 +1982,7 @@
           <a:p>
             <a:fld id="{4DBD1E3A-4E22-4317-B6F0-1BA28CFB09D2}" type="datetimeFigureOut">
               <a:rPr lang="pt-BR" smtClean="0"/>
-              <a:t>28/04/2020</a:t>
+              <a:t>29/04/2020</a:t>
             </a:fld>
             <a:endParaRPr lang="pt-BR"/>
           </a:p>
@@ -2077,7 +2077,7 @@
           <a:p>
             <a:fld id="{4DBD1E3A-4E22-4317-B6F0-1BA28CFB09D2}" type="datetimeFigureOut">
               <a:rPr lang="pt-BR" smtClean="0"/>
-              <a:t>28/04/2020</a:t>
+              <a:t>29/04/2020</a:t>
             </a:fld>
             <a:endParaRPr lang="pt-BR"/>
           </a:p>
@@ -2354,7 +2354,7 @@
           <a:p>
             <a:fld id="{4DBD1E3A-4E22-4317-B6F0-1BA28CFB09D2}" type="datetimeFigureOut">
               <a:rPr lang="pt-BR" smtClean="0"/>
-              <a:t>28/04/2020</a:t>
+              <a:t>29/04/2020</a:t>
             </a:fld>
             <a:endParaRPr lang="pt-BR"/>
           </a:p>
@@ -2524,7 +2524,7 @@
           <a:p>
             <a:fld id="{4DBD1E3A-4E22-4317-B6F0-1BA28CFB09D2}" type="datetimeFigureOut">
               <a:rPr lang="pt-BR" smtClean="0"/>
-              <a:t>28/04/2020</a:t>
+              <a:t>29/04/2020</a:t>
             </a:fld>
             <a:endParaRPr lang="pt-BR"/>
           </a:p>
@@ -2781,7 +2781,7 @@
           <a:p>
             <a:fld id="{4DBD1E3A-4E22-4317-B6F0-1BA28CFB09D2}" type="datetimeFigureOut">
               <a:rPr lang="pt-BR" smtClean="0"/>
-              <a:t>28/04/2020</a:t>
+              <a:t>29/04/2020</a:t>
             </a:fld>
             <a:endParaRPr lang="pt-BR"/>
           </a:p>
@@ -2951,7 +2951,7 @@
           <a:p>
             <a:fld id="{4DBD1E3A-4E22-4317-B6F0-1BA28CFB09D2}" type="datetimeFigureOut">
               <a:rPr lang="pt-BR" smtClean="0"/>
-              <a:t>28/04/2020</a:t>
+              <a:t>29/04/2020</a:t>
             </a:fld>
             <a:endParaRPr lang="pt-BR"/>
           </a:p>
@@ -3131,7 +3131,7 @@
           <a:p>
             <a:fld id="{4DBD1E3A-4E22-4317-B6F0-1BA28CFB09D2}" type="datetimeFigureOut">
               <a:rPr lang="pt-BR" smtClean="0"/>
-              <a:t>28/04/2020</a:t>
+              <a:t>29/04/2020</a:t>
             </a:fld>
             <a:endParaRPr lang="pt-BR"/>
           </a:p>
@@ -3372,7 +3372,7 @@
                 <a:tabLst/>
                 <a:defRPr/>
               </a:pPr>
-              <a:t>28/04/2020</a:t>
+              <a:t>29/04/2020</a:t>
             </a:fld>
             <a:endParaRPr kumimoji="0" lang="pt-BR" sz="1200" b="0" i="0" u="none" strike="noStrike" kern="1200" cap="none" spc="0" normalizeH="0" baseline="0" noProof="0" smtClean="0">
               <a:ln>
@@ -3702,7 +3702,7 @@
                 <a:tabLst/>
                 <a:defRPr/>
               </a:pPr>
-              <a:t>28/04/2020</a:t>
+              <a:t>29/04/2020</a:t>
             </a:fld>
             <a:endParaRPr kumimoji="0" lang="pt-BR" sz="1200" b="0" i="0" u="none" strike="noStrike" kern="1200" cap="none" spc="0" normalizeH="0" baseline="0" noProof="0" smtClean="0">
               <a:ln>
@@ -4108,7 +4108,7 @@
                 <a:tabLst/>
                 <a:defRPr/>
               </a:pPr>
-              <a:t>28/04/2020</a:t>
+              <a:t>29/04/2020</a:t>
             </a:fld>
             <a:endParaRPr kumimoji="0" lang="pt-BR" sz="1200" b="0" i="0" u="none" strike="noStrike" kern="1200" cap="none" spc="0" normalizeH="0" baseline="0" noProof="0" smtClean="0">
               <a:ln>
@@ -4500,7 +4500,7 @@
                 <a:tabLst/>
                 <a:defRPr/>
               </a:pPr>
-              <a:t>28/04/2020</a:t>
+              <a:t>29/04/2020</a:t>
             </a:fld>
             <a:endParaRPr kumimoji="0" lang="pt-BR" sz="1200" b="0" i="0" u="none" strike="noStrike" kern="1200" cap="none" spc="0" normalizeH="0" baseline="0" noProof="0" smtClean="0">
               <a:ln>
@@ -5027,7 +5027,7 @@
                 <a:tabLst/>
                 <a:defRPr/>
               </a:pPr>
-              <a:t>28/04/2020</a:t>
+              <a:t>29/04/2020</a:t>
             </a:fld>
             <a:endParaRPr kumimoji="0" lang="pt-BR" sz="1200" b="0" i="0" u="none" strike="noStrike" kern="1200" cap="none" spc="0" normalizeH="0" baseline="0" noProof="0" smtClean="0">
               <a:ln>
@@ -5305,7 +5305,7 @@
                 <a:tabLst/>
                 <a:defRPr/>
               </a:pPr>
-              <a:t>28/04/2020</a:t>
+              <a:t>29/04/2020</a:t>
             </a:fld>
             <a:endParaRPr kumimoji="0" lang="pt-BR" sz="1200" b="0" i="0" u="none" strike="noStrike" kern="1200" cap="none" spc="0" normalizeH="0" baseline="0" noProof="0" smtClean="0">
               <a:ln>
@@ -5560,7 +5560,7 @@
                 <a:tabLst/>
                 <a:defRPr/>
               </a:pPr>
-              <a:t>28/04/2020</a:t>
+              <a:t>29/04/2020</a:t>
             </a:fld>
             <a:endParaRPr kumimoji="0" lang="pt-BR" sz="1200" b="0" i="0" u="none" strike="noStrike" kern="1200" cap="none" spc="0" normalizeH="0" baseline="0" noProof="0" smtClean="0">
               <a:ln>
@@ -5917,7 +5917,7 @@
           <a:p>
             <a:fld id="{4DBD1E3A-4E22-4317-B6F0-1BA28CFB09D2}" type="datetimeFigureOut">
               <a:rPr lang="pt-BR" smtClean="0"/>
-              <a:t>28/04/2020</a:t>
+              <a:t>29/04/2020</a:t>
             </a:fld>
             <a:endParaRPr lang="pt-BR"/>
           </a:p>
@@ -6243,7 +6243,7 @@
                 <a:tabLst/>
                 <a:defRPr/>
               </a:pPr>
-              <a:t>28/04/2020</a:t>
+              <a:t>29/04/2020</a:t>
             </a:fld>
             <a:endParaRPr kumimoji="0" lang="pt-BR" sz="1200" b="0" i="0" u="none" strike="noStrike" kern="1200" cap="none" spc="0" normalizeH="0" baseline="0" noProof="0" smtClean="0">
               <a:ln>
@@ -6656,7 +6656,7 @@
                 <a:tabLst/>
                 <a:defRPr/>
               </a:pPr>
-              <a:t>28/04/2020</a:t>
+              <a:t>29/04/2020</a:t>
             </a:fld>
             <a:endParaRPr kumimoji="0" lang="pt-BR" sz="1200" b="0" i="0" u="none" strike="noStrike" kern="1200" cap="none" spc="0" normalizeH="0" baseline="0" noProof="0" smtClean="0">
               <a:ln>
@@ -6986,7 +6986,7 @@
                 <a:tabLst/>
                 <a:defRPr/>
               </a:pPr>
-              <a:t>28/04/2020</a:t>
+              <a:t>29/04/2020</a:t>
             </a:fld>
             <a:endParaRPr kumimoji="0" lang="pt-BR" sz="1200" b="0" i="0" u="none" strike="noStrike" kern="1200" cap="none" spc="0" normalizeH="0" baseline="0" noProof="0" smtClean="0">
               <a:ln>
@@ -7326,7 +7326,7 @@
                 <a:tabLst/>
                 <a:defRPr/>
               </a:pPr>
-              <a:t>28/04/2020</a:t>
+              <a:t>29/04/2020</a:t>
             </a:fld>
             <a:endParaRPr kumimoji="0" lang="pt-BR" sz="1200" b="0" i="0" u="none" strike="noStrike" kern="1200" cap="none" spc="0" normalizeH="0" baseline="0" noProof="0" smtClean="0">
               <a:ln>
@@ -7678,7 +7678,7 @@
                 <a:tabLst/>
                 <a:defRPr/>
               </a:pPr>
-              <a:t>28/04/2020</a:t>
+              <a:t>29/04/2020</a:t>
             </a:fld>
             <a:endParaRPr kumimoji="0" lang="pt-BR" sz="1200" b="0" i="0" u="none" strike="noStrike" kern="1200" cap="none" spc="0" normalizeH="0" baseline="0" noProof="0">
               <a:ln>
@@ -8008,7 +8008,7 @@
                 <a:tabLst/>
                 <a:defRPr/>
               </a:pPr>
-              <a:t>28/04/2020</a:t>
+              <a:t>29/04/2020</a:t>
             </a:fld>
             <a:endParaRPr kumimoji="0" lang="pt-BR" sz="1200" b="0" i="0" u="none" strike="noStrike" kern="1200" cap="none" spc="0" normalizeH="0" baseline="0" noProof="0">
               <a:ln>
@@ -8414,7 +8414,7 @@
                 <a:tabLst/>
                 <a:defRPr/>
               </a:pPr>
-              <a:t>28/04/2020</a:t>
+              <a:t>29/04/2020</a:t>
             </a:fld>
             <a:endParaRPr kumimoji="0" lang="pt-BR" sz="1200" b="0" i="0" u="none" strike="noStrike" kern="1200" cap="none" spc="0" normalizeH="0" baseline="0" noProof="0">
               <a:ln>
@@ -8806,7 +8806,7 @@
                 <a:tabLst/>
                 <a:defRPr/>
               </a:pPr>
-              <a:t>28/04/2020</a:t>
+              <a:t>29/04/2020</a:t>
             </a:fld>
             <a:endParaRPr kumimoji="0" lang="pt-BR" sz="1200" b="0" i="0" u="none" strike="noStrike" kern="1200" cap="none" spc="0" normalizeH="0" baseline="0" noProof="0">
               <a:ln>
@@ -9333,7 +9333,7 @@
                 <a:tabLst/>
                 <a:defRPr/>
               </a:pPr>
-              <a:t>28/04/2020</a:t>
+              <a:t>29/04/2020</a:t>
             </a:fld>
             <a:endParaRPr kumimoji="0" lang="pt-BR" sz="1200" b="0" i="0" u="none" strike="noStrike" kern="1200" cap="none" spc="0" normalizeH="0" baseline="0" noProof="0">
               <a:ln>
@@ -9611,7 +9611,7 @@
                 <a:tabLst/>
                 <a:defRPr/>
               </a:pPr>
-              <a:t>28/04/2020</a:t>
+              <a:t>29/04/2020</a:t>
             </a:fld>
             <a:endParaRPr kumimoji="0" lang="pt-BR" sz="1200" b="0" i="0" u="none" strike="noStrike" kern="1200" cap="none" spc="0" normalizeH="0" baseline="0" noProof="0">
               <a:ln>
@@ -9954,7 +9954,7 @@
           <a:p>
             <a:fld id="{4DBD1E3A-4E22-4317-B6F0-1BA28CFB09D2}" type="datetimeFigureOut">
               <a:rPr lang="pt-BR" smtClean="0"/>
-              <a:t>28/04/2020</a:t>
+              <a:t>29/04/2020</a:t>
             </a:fld>
             <a:endParaRPr lang="pt-BR"/>
           </a:p>
@@ -10098,7 +10098,7 @@
                 <a:tabLst/>
                 <a:defRPr/>
               </a:pPr>
-              <a:t>28/04/2020</a:t>
+              <a:t>29/04/2020</a:t>
             </a:fld>
             <a:endParaRPr kumimoji="0" lang="pt-BR" sz="1200" b="0" i="0" u="none" strike="noStrike" kern="1200" cap="none" spc="0" normalizeH="0" baseline="0" noProof="0">
               <a:ln>
@@ -10535,7 +10535,7 @@
                 <a:tabLst/>
                 <a:defRPr/>
               </a:pPr>
-              <a:t>28/04/2020</a:t>
+              <a:t>29/04/2020</a:t>
             </a:fld>
             <a:endParaRPr kumimoji="0" lang="pt-BR" sz="1200" b="0" i="0" u="none" strike="noStrike" kern="1200" cap="none" spc="0" normalizeH="0" baseline="0" noProof="0">
               <a:ln>
@@ -10952,7 +10952,7 @@
                 <a:tabLst/>
                 <a:defRPr/>
               </a:pPr>
-              <a:t>28/04/2020</a:t>
+              <a:t>29/04/2020</a:t>
             </a:fld>
             <a:endParaRPr kumimoji="0" lang="pt-BR" sz="1200" b="0" i="0" u="none" strike="noStrike" kern="1200" cap="none" spc="0" normalizeH="0" baseline="0" noProof="0">
               <a:ln>
@@ -11282,7 +11282,7 @@
                 <a:tabLst/>
                 <a:defRPr/>
               </a:pPr>
-              <a:t>28/04/2020</a:t>
+              <a:t>29/04/2020</a:t>
             </a:fld>
             <a:endParaRPr kumimoji="0" lang="pt-BR" sz="1200" b="0" i="0" u="none" strike="noStrike" kern="1200" cap="none" spc="0" normalizeH="0" baseline="0" noProof="0">
               <a:ln>
@@ -11622,7 +11622,7 @@
                 <a:tabLst/>
                 <a:defRPr/>
               </a:pPr>
-              <a:t>28/04/2020</a:t>
+              <a:t>29/04/2020</a:t>
             </a:fld>
             <a:endParaRPr kumimoji="0" lang="pt-BR" sz="1200" b="0" i="0" u="none" strike="noStrike" kern="1200" cap="none" spc="0" normalizeH="0" baseline="0" noProof="0">
               <a:ln>
@@ -11974,7 +11974,7 @@
                 <a:tabLst/>
                 <a:defRPr/>
               </a:pPr>
-              <a:t>28/04/2020</a:t>
+              <a:t>29/04/2020</a:t>
             </a:fld>
             <a:endParaRPr kumimoji="0" lang="pt-BR" sz="1200" b="0" i="0" u="none" strike="noStrike" kern="1200" cap="none" spc="0" normalizeH="0" baseline="0" noProof="0">
               <a:ln>
@@ -12304,7 +12304,7 @@
                 <a:tabLst/>
                 <a:defRPr/>
               </a:pPr>
-              <a:t>28/04/2020</a:t>
+              <a:t>29/04/2020</a:t>
             </a:fld>
             <a:endParaRPr kumimoji="0" lang="pt-BR" sz="1200" b="0" i="0" u="none" strike="noStrike" kern="1200" cap="none" spc="0" normalizeH="0" baseline="0" noProof="0">
               <a:ln>
@@ -12710,7 +12710,7 @@
                 <a:tabLst/>
                 <a:defRPr/>
               </a:pPr>
-              <a:t>28/04/2020</a:t>
+              <a:t>29/04/2020</a:t>
             </a:fld>
             <a:endParaRPr kumimoji="0" lang="pt-BR" sz="1200" b="0" i="0" u="none" strike="noStrike" kern="1200" cap="none" spc="0" normalizeH="0" baseline="0" noProof="0">
               <a:ln>
@@ -13102,7 +13102,7 @@
                 <a:tabLst/>
                 <a:defRPr/>
               </a:pPr>
-              <a:t>28/04/2020</a:t>
+              <a:t>29/04/2020</a:t>
             </a:fld>
             <a:endParaRPr kumimoji="0" lang="pt-BR" sz="1200" b="0" i="0" u="none" strike="noStrike" kern="1200" cap="none" spc="0" normalizeH="0" baseline="0" noProof="0">
               <a:ln>
@@ -13629,7 +13629,7 @@
                 <a:tabLst/>
                 <a:defRPr/>
               </a:pPr>
-              <a:t>28/04/2020</a:t>
+              <a:t>29/04/2020</a:t>
             </a:fld>
             <a:endParaRPr kumimoji="0" lang="pt-BR" sz="1200" b="0" i="0" u="none" strike="noStrike" kern="1200" cap="none" spc="0" normalizeH="0" baseline="0" noProof="0">
               <a:ln>
@@ -14107,7 +14107,7 @@
           <a:p>
             <a:fld id="{4DBD1E3A-4E22-4317-B6F0-1BA28CFB09D2}" type="datetimeFigureOut">
               <a:rPr lang="pt-BR" smtClean="0"/>
-              <a:t>28/04/2020</a:t>
+              <a:t>29/04/2020</a:t>
             </a:fld>
             <a:endParaRPr lang="pt-BR"/>
           </a:p>
@@ -14274,7 +14274,7 @@
                 <a:tabLst/>
                 <a:defRPr/>
               </a:pPr>
-              <a:t>28/04/2020</a:t>
+              <a:t>29/04/2020</a:t>
             </a:fld>
             <a:endParaRPr kumimoji="0" lang="pt-BR" sz="1200" b="0" i="0" u="none" strike="noStrike" kern="1200" cap="none" spc="0" normalizeH="0" baseline="0" noProof="0">
               <a:ln>
@@ -14529,7 +14529,7 @@
                 <a:tabLst/>
                 <a:defRPr/>
               </a:pPr>
-              <a:t>28/04/2020</a:t>
+              <a:t>29/04/2020</a:t>
             </a:fld>
             <a:endParaRPr kumimoji="0" lang="pt-BR" sz="1200" b="0" i="0" u="none" strike="noStrike" kern="1200" cap="none" spc="0" normalizeH="0" baseline="0" noProof="0">
               <a:ln>
@@ -14966,7 +14966,7 @@
                 <a:tabLst/>
                 <a:defRPr/>
               </a:pPr>
-              <a:t>28/04/2020</a:t>
+              <a:t>29/04/2020</a:t>
             </a:fld>
             <a:endParaRPr kumimoji="0" lang="pt-BR" sz="1200" b="0" i="0" u="none" strike="noStrike" kern="1200" cap="none" spc="0" normalizeH="0" baseline="0" noProof="0">
               <a:ln>
@@ -15383,7 +15383,7 @@
                 <a:tabLst/>
                 <a:defRPr/>
               </a:pPr>
-              <a:t>28/04/2020</a:t>
+              <a:t>29/04/2020</a:t>
             </a:fld>
             <a:endParaRPr kumimoji="0" lang="pt-BR" sz="1200" b="0" i="0" u="none" strike="noStrike" kern="1200" cap="none" spc="0" normalizeH="0" baseline="0" noProof="0">
               <a:ln>
@@ -15713,7 +15713,7 @@
                 <a:tabLst/>
                 <a:defRPr/>
               </a:pPr>
-              <a:t>28/04/2020</a:t>
+              <a:t>29/04/2020</a:t>
             </a:fld>
             <a:endParaRPr kumimoji="0" lang="pt-BR" sz="1200" b="0" i="0" u="none" strike="noStrike" kern="1200" cap="none" spc="0" normalizeH="0" baseline="0" noProof="0">
               <a:ln>
@@ -16053,7 +16053,7 @@
                 <a:tabLst/>
                 <a:defRPr/>
               </a:pPr>
-              <a:t>28/04/2020</a:t>
+              <a:t>29/04/2020</a:t>
             </a:fld>
             <a:endParaRPr kumimoji="0" lang="pt-BR" sz="1200" b="0" i="0" u="none" strike="noStrike" kern="1200" cap="none" spc="0" normalizeH="0" baseline="0" noProof="0">
               <a:ln>
@@ -16405,7 +16405,7 @@
                 <a:tabLst/>
                 <a:defRPr/>
               </a:pPr>
-              <a:t>28/04/2020</a:t>
+              <a:t>29/04/2020</a:t>
             </a:fld>
             <a:endParaRPr kumimoji="0" lang="pt-BR" sz="1200" b="0" i="0" u="none" strike="noStrike" kern="1200" cap="none" spc="0" normalizeH="0" baseline="0" noProof="0" smtClean="0">
               <a:ln>
@@ -16735,7 +16735,7 @@
                 <a:tabLst/>
                 <a:defRPr/>
               </a:pPr>
-              <a:t>28/04/2020</a:t>
+              <a:t>29/04/2020</a:t>
             </a:fld>
             <a:endParaRPr kumimoji="0" lang="pt-BR" sz="1200" b="0" i="0" u="none" strike="noStrike" kern="1200" cap="none" spc="0" normalizeH="0" baseline="0" noProof="0" smtClean="0">
               <a:ln>
@@ -17141,7 +17141,7 @@
                 <a:tabLst/>
                 <a:defRPr/>
               </a:pPr>
-              <a:t>28/04/2020</a:t>
+              <a:t>29/04/2020</a:t>
             </a:fld>
             <a:endParaRPr kumimoji="0" lang="pt-BR" sz="1200" b="0" i="0" u="none" strike="noStrike" kern="1200" cap="none" spc="0" normalizeH="0" baseline="0" noProof="0" smtClean="0">
               <a:ln>
@@ -17533,7 +17533,7 @@
                 <a:tabLst/>
                 <a:defRPr/>
               </a:pPr>
-              <a:t>28/04/2020</a:t>
+              <a:t>29/04/2020</a:t>
             </a:fld>
             <a:endParaRPr kumimoji="0" lang="pt-BR" sz="1200" b="0" i="0" u="none" strike="noStrike" kern="1200" cap="none" spc="0" normalizeH="0" baseline="0" noProof="0" smtClean="0">
               <a:ln>
@@ -17762,7 +17762,7 @@
           <a:p>
             <a:fld id="{4DBD1E3A-4E22-4317-B6F0-1BA28CFB09D2}" type="datetimeFigureOut">
               <a:rPr lang="pt-BR" smtClean="0"/>
-              <a:t>28/04/2020</a:t>
+              <a:t>29/04/2020</a:t>
             </a:fld>
             <a:endParaRPr lang="pt-BR"/>
           </a:p>
@@ -18178,7 +18178,7 @@
                 <a:tabLst/>
                 <a:defRPr/>
               </a:pPr>
-              <a:t>28/04/2020</a:t>
+              <a:t>29/04/2020</a:t>
             </a:fld>
             <a:endParaRPr kumimoji="0" lang="pt-BR" sz="1200" b="0" i="0" u="none" strike="noStrike" kern="1200" cap="none" spc="0" normalizeH="0" baseline="0" noProof="0" smtClean="0">
               <a:ln>
@@ -18456,7 +18456,7 @@
                 <a:tabLst/>
                 <a:defRPr/>
               </a:pPr>
-              <a:t>28/04/2020</a:t>
+              <a:t>29/04/2020</a:t>
             </a:fld>
             <a:endParaRPr kumimoji="0" lang="pt-BR" sz="1200" b="0" i="0" u="none" strike="noStrike" kern="1200" cap="none" spc="0" normalizeH="0" baseline="0" noProof="0" smtClean="0">
               <a:ln>
@@ -18711,7 +18711,7 @@
                 <a:tabLst/>
                 <a:defRPr/>
               </a:pPr>
-              <a:t>28/04/2020</a:t>
+              <a:t>29/04/2020</a:t>
             </a:fld>
             <a:endParaRPr kumimoji="0" lang="pt-BR" sz="1200" b="0" i="0" u="none" strike="noStrike" kern="1200" cap="none" spc="0" normalizeH="0" baseline="0" noProof="0" smtClean="0">
               <a:ln>
@@ -19148,7 +19148,7 @@
                 <a:tabLst/>
                 <a:defRPr/>
               </a:pPr>
-              <a:t>28/04/2020</a:t>
+              <a:t>29/04/2020</a:t>
             </a:fld>
             <a:endParaRPr kumimoji="0" lang="pt-BR" sz="1200" b="0" i="0" u="none" strike="noStrike" kern="1200" cap="none" spc="0" normalizeH="0" baseline="0" noProof="0" smtClean="0">
               <a:ln>
@@ -19561,7 +19561,7 @@
                 <a:tabLst/>
                 <a:defRPr/>
               </a:pPr>
-              <a:t>28/04/2020</a:t>
+              <a:t>29/04/2020</a:t>
             </a:fld>
             <a:endParaRPr kumimoji="0" lang="pt-BR" sz="1200" b="0" i="0" u="none" strike="noStrike" kern="1200" cap="none" spc="0" normalizeH="0" baseline="0" noProof="0" smtClean="0">
               <a:ln>
@@ -19891,7 +19891,7 @@
                 <a:tabLst/>
                 <a:defRPr/>
               </a:pPr>
-              <a:t>28/04/2020</a:t>
+              <a:t>29/04/2020</a:t>
             </a:fld>
             <a:endParaRPr kumimoji="0" lang="pt-BR" sz="1200" b="0" i="0" u="none" strike="noStrike" kern="1200" cap="none" spc="0" normalizeH="0" baseline="0" noProof="0" smtClean="0">
               <a:ln>
@@ -20231,7 +20231,7 @@
                 <a:tabLst/>
                 <a:defRPr/>
               </a:pPr>
-              <a:t>28/04/2020</a:t>
+              <a:t>29/04/2020</a:t>
             </a:fld>
             <a:endParaRPr kumimoji="0" lang="pt-BR" sz="1200" b="0" i="0" u="none" strike="noStrike" kern="1200" cap="none" spc="0" normalizeH="0" baseline="0" noProof="0" smtClean="0">
               <a:ln>
@@ -20583,7 +20583,7 @@
                 <a:tabLst/>
                 <a:defRPr/>
               </a:pPr>
-              <a:t>28/04/2020</a:t>
+              <a:t>29/04/2020</a:t>
             </a:fld>
             <a:endParaRPr kumimoji="0" lang="pt-BR" sz="1200" b="0" i="0" u="none" strike="noStrike" kern="1200" cap="none" spc="0" normalizeH="0" baseline="0" noProof="0">
               <a:ln>
@@ -20913,7 +20913,7 @@
                 <a:tabLst/>
                 <a:defRPr/>
               </a:pPr>
-              <a:t>28/04/2020</a:t>
+              <a:t>29/04/2020</a:t>
             </a:fld>
             <a:endParaRPr kumimoji="0" lang="pt-BR" sz="1200" b="0" i="0" u="none" strike="noStrike" kern="1200" cap="none" spc="0" normalizeH="0" baseline="0" noProof="0">
               <a:ln>
@@ -21319,7 +21319,7 @@
                 <a:tabLst/>
                 <a:defRPr/>
               </a:pPr>
-              <a:t>28/04/2020</a:t>
+              <a:t>29/04/2020</a:t>
             </a:fld>
             <a:endParaRPr kumimoji="0" lang="pt-BR" sz="1200" b="0" i="0" u="none" strike="noStrike" kern="1200" cap="none" spc="0" normalizeH="0" baseline="0" noProof="0">
               <a:ln>
@@ -21525,7 +21525,7 @@
           <a:p>
             <a:fld id="{4DBD1E3A-4E22-4317-B6F0-1BA28CFB09D2}" type="datetimeFigureOut">
               <a:rPr lang="pt-BR" smtClean="0"/>
-              <a:t>28/04/2020</a:t>
+              <a:t>29/04/2020</a:t>
             </a:fld>
             <a:endParaRPr lang="pt-BR"/>
           </a:p>
@@ -21806,7 +21806,7 @@
                 <a:tabLst/>
                 <a:defRPr/>
               </a:pPr>
-              <a:t>28/04/2020</a:t>
+              <a:t>29/04/2020</a:t>
             </a:fld>
             <a:endParaRPr kumimoji="0" lang="pt-BR" sz="1200" b="0" i="0" u="none" strike="noStrike" kern="1200" cap="none" spc="0" normalizeH="0" baseline="0" noProof="0">
               <a:ln>
@@ -22333,7 +22333,7 @@
                 <a:tabLst/>
                 <a:defRPr/>
               </a:pPr>
-              <a:t>28/04/2020</a:t>
+              <a:t>29/04/2020</a:t>
             </a:fld>
             <a:endParaRPr kumimoji="0" lang="pt-BR" sz="1200" b="0" i="0" u="none" strike="noStrike" kern="1200" cap="none" spc="0" normalizeH="0" baseline="0" noProof="0">
               <a:ln>
@@ -22611,7 +22611,7 @@
                 <a:tabLst/>
                 <a:defRPr/>
               </a:pPr>
-              <a:t>28/04/2020</a:t>
+              <a:t>29/04/2020</a:t>
             </a:fld>
             <a:endParaRPr kumimoji="0" lang="pt-BR" sz="1200" b="0" i="0" u="none" strike="noStrike" kern="1200" cap="none" spc="0" normalizeH="0" baseline="0" noProof="0">
               <a:ln>
@@ -22866,7 +22866,7 @@
                 <a:tabLst/>
                 <a:defRPr/>
               </a:pPr>
-              <a:t>28/04/2020</a:t>
+              <a:t>29/04/2020</a:t>
             </a:fld>
             <a:endParaRPr kumimoji="0" lang="pt-BR" sz="1200" b="0" i="0" u="none" strike="noStrike" kern="1200" cap="none" spc="0" normalizeH="0" baseline="0" noProof="0">
               <a:ln>
@@ -23303,7 +23303,7 @@
                 <a:tabLst/>
                 <a:defRPr/>
               </a:pPr>
-              <a:t>28/04/2020</a:t>
+              <a:t>29/04/2020</a:t>
             </a:fld>
             <a:endParaRPr kumimoji="0" lang="pt-BR" sz="1200" b="0" i="0" u="none" strike="noStrike" kern="1200" cap="none" spc="0" normalizeH="0" baseline="0" noProof="0">
               <a:ln>
@@ -23720,7 +23720,7 @@
                 <a:tabLst/>
                 <a:defRPr/>
               </a:pPr>
-              <a:t>28/04/2020</a:t>
+              <a:t>29/04/2020</a:t>
             </a:fld>
             <a:endParaRPr kumimoji="0" lang="pt-BR" sz="1200" b="0" i="0" u="none" strike="noStrike" kern="1200" cap="none" spc="0" normalizeH="0" baseline="0" noProof="0">
               <a:ln>
@@ -24050,7 +24050,7 @@
                 <a:tabLst/>
                 <a:defRPr/>
               </a:pPr>
-              <a:t>28/04/2020</a:t>
+              <a:t>29/04/2020</a:t>
             </a:fld>
             <a:endParaRPr kumimoji="0" lang="pt-BR" sz="1200" b="0" i="0" u="none" strike="noStrike" kern="1200" cap="none" spc="0" normalizeH="0" baseline="0" noProof="0">
               <a:ln>
@@ -24390,7 +24390,7 @@
                 <a:tabLst/>
                 <a:defRPr/>
               </a:pPr>
-              <a:t>28/04/2020</a:t>
+              <a:t>29/04/2020</a:t>
             </a:fld>
             <a:endParaRPr kumimoji="0" lang="pt-BR" sz="1200" b="0" i="0" u="none" strike="noStrike" kern="1200" cap="none" spc="0" normalizeH="0" baseline="0" noProof="0">
               <a:ln>
@@ -24742,7 +24742,7 @@
                 <a:tabLst/>
                 <a:defRPr/>
               </a:pPr>
-              <a:t>28/04/2020</a:t>
+              <a:t>29/04/2020</a:t>
             </a:fld>
             <a:endParaRPr kumimoji="0" lang="pt-BR" sz="1200" b="0" i="0" u="none" strike="noStrike" kern="1200" cap="none" spc="0" normalizeH="0" baseline="0" noProof="0">
               <a:ln>
@@ -25072,7 +25072,7 @@
                 <a:tabLst/>
                 <a:defRPr/>
               </a:pPr>
-              <a:t>28/04/2020</a:t>
+              <a:t>29/04/2020</a:t>
             </a:fld>
             <a:endParaRPr kumimoji="0" lang="pt-BR" sz="1200" b="0" i="0" u="none" strike="noStrike" kern="1200" cap="none" spc="0" normalizeH="0" baseline="0" noProof="0">
               <a:ln>
@@ -25460,7 +25460,7 @@
           <a:p>
             <a:fld id="{4DBD1E3A-4E22-4317-B6F0-1BA28CFB09D2}" type="datetimeFigureOut">
               <a:rPr lang="pt-BR" smtClean="0"/>
-              <a:t>28/04/2020</a:t>
+              <a:t>29/04/2020</a:t>
             </a:fld>
             <a:endParaRPr lang="pt-BR"/>
           </a:p>
@@ -25755,7 +25755,7 @@
                 <a:tabLst/>
                 <a:defRPr/>
               </a:pPr>
-              <a:t>28/04/2020</a:t>
+              <a:t>29/04/2020</a:t>
             </a:fld>
             <a:endParaRPr kumimoji="0" lang="pt-BR" sz="1200" b="0" i="0" u="none" strike="noStrike" kern="1200" cap="none" spc="0" normalizeH="0" baseline="0" noProof="0">
               <a:ln>
@@ -26147,7 +26147,7 @@
                 <a:tabLst/>
                 <a:defRPr/>
               </a:pPr>
-              <a:t>28/04/2020</a:t>
+              <a:t>29/04/2020</a:t>
             </a:fld>
             <a:endParaRPr kumimoji="0" lang="pt-BR" sz="1200" b="0" i="0" u="none" strike="noStrike" kern="1200" cap="none" spc="0" normalizeH="0" baseline="0" noProof="0">
               <a:ln>
@@ -26674,7 +26674,7 @@
                 <a:tabLst/>
                 <a:defRPr/>
               </a:pPr>
-              <a:t>28/04/2020</a:t>
+              <a:t>29/04/2020</a:t>
             </a:fld>
             <a:endParaRPr kumimoji="0" lang="pt-BR" sz="1200" b="0" i="0" u="none" strike="noStrike" kern="1200" cap="none" spc="0" normalizeH="0" baseline="0" noProof="0">
               <a:ln>
@@ -26952,7 +26952,7 @@
                 <a:tabLst/>
                 <a:defRPr/>
               </a:pPr>
-              <a:t>28/04/2020</a:t>
+              <a:t>29/04/2020</a:t>
             </a:fld>
             <a:endParaRPr kumimoji="0" lang="pt-BR" sz="1200" b="0" i="0" u="none" strike="noStrike" kern="1200" cap="none" spc="0" normalizeH="0" baseline="0" noProof="0">
               <a:ln>
@@ -27207,7 +27207,7 @@
                 <a:tabLst/>
                 <a:defRPr/>
               </a:pPr>
-              <a:t>28/04/2020</a:t>
+              <a:t>29/04/2020</a:t>
             </a:fld>
             <a:endParaRPr kumimoji="0" lang="pt-BR" sz="1200" b="0" i="0" u="none" strike="noStrike" kern="1200" cap="none" spc="0" normalizeH="0" baseline="0" noProof="0">
               <a:ln>
@@ -27644,7 +27644,7 @@
                 <a:tabLst/>
                 <a:defRPr/>
               </a:pPr>
-              <a:t>28/04/2020</a:t>
+              <a:t>29/04/2020</a:t>
             </a:fld>
             <a:endParaRPr kumimoji="0" lang="pt-BR" sz="1200" b="0" i="0" u="none" strike="noStrike" kern="1200" cap="none" spc="0" normalizeH="0" baseline="0" noProof="0">
               <a:ln>
@@ -28061,7 +28061,7 @@
                 <a:tabLst/>
                 <a:defRPr/>
               </a:pPr>
-              <a:t>28/04/2020</a:t>
+              <a:t>29/04/2020</a:t>
             </a:fld>
             <a:endParaRPr kumimoji="0" lang="pt-BR" sz="1200" b="0" i="0" u="none" strike="noStrike" kern="1200" cap="none" spc="0" normalizeH="0" baseline="0" noProof="0">
               <a:ln>
@@ -28391,7 +28391,7 @@
                 <a:tabLst/>
                 <a:defRPr/>
               </a:pPr>
-              <a:t>28/04/2020</a:t>
+              <a:t>29/04/2020</a:t>
             </a:fld>
             <a:endParaRPr kumimoji="0" lang="pt-BR" sz="1200" b="0" i="0" u="none" strike="noStrike" kern="1200" cap="none" spc="0" normalizeH="0" baseline="0" noProof="0">
               <a:ln>
@@ -28731,7 +28731,7 @@
                 <a:tabLst/>
                 <a:defRPr/>
               </a:pPr>
-              <a:t>28/04/2020</a:t>
+              <a:t>29/04/2020</a:t>
             </a:fld>
             <a:endParaRPr kumimoji="0" lang="pt-BR" sz="1200" b="0" i="0" u="none" strike="noStrike" kern="1200" cap="none" spc="0" normalizeH="0" baseline="0" noProof="0">
               <a:ln>
@@ -29095,7 +29095,7 @@
           <a:p>
             <a:fld id="{4DBD1E3A-4E22-4317-B6F0-1BA28CFB09D2}" type="datetimeFigureOut">
               <a:rPr lang="pt-BR" smtClean="0"/>
-              <a:t>28/04/2020</a:t>
+              <a:t>29/04/2020</a:t>
             </a:fld>
             <a:endParaRPr lang="pt-BR"/>
           </a:p>
@@ -29308,7 +29308,7 @@
           <a:p>
             <a:fld id="{4DBD1E3A-4E22-4317-B6F0-1BA28CFB09D2}" type="datetimeFigureOut">
               <a:rPr lang="pt-BR" smtClean="0"/>
-              <a:t>28/04/2020</a:t>
+              <a:t>29/04/2020</a:t>
             </a:fld>
             <a:endParaRPr lang="pt-BR"/>
           </a:p>
@@ -29848,7 +29848,7 @@
           <a:p>
             <a:fld id="{4DBD1E3A-4E22-4317-B6F0-1BA28CFB09D2}" type="datetimeFigureOut">
               <a:rPr lang="pt-BR" smtClean="0"/>
-              <a:t>28/04/2020</a:t>
+              <a:t>29/04/2020</a:t>
             </a:fld>
             <a:endParaRPr lang="pt-BR"/>
           </a:p>
@@ -30437,7 +30437,7 @@
                 <a:tabLst/>
                 <a:defRPr/>
               </a:pPr>
-              <a:t>28/04/2020</a:t>
+              <a:t>29/04/2020</a:t>
             </a:fld>
             <a:endParaRPr kumimoji="0" lang="pt-BR" sz="1200" b="0" i="0" u="none" strike="noStrike" kern="1200" cap="none" spc="0" normalizeH="0" baseline="0" noProof="0" smtClean="0">
               <a:ln>
@@ -31137,7 +31137,7 @@
                 <a:tabLst/>
                 <a:defRPr/>
               </a:pPr>
-              <a:t>28/04/2020</a:t>
+              <a:t>29/04/2020</a:t>
             </a:fld>
             <a:endParaRPr kumimoji="0" lang="pt-BR" sz="1200" b="0" i="0" u="none" strike="noStrike" kern="1200" cap="none" spc="0" normalizeH="0" baseline="0" noProof="0">
               <a:ln>
@@ -31837,7 +31837,7 @@
                 <a:tabLst/>
                 <a:defRPr/>
               </a:pPr>
-              <a:t>28/04/2020</a:t>
+              <a:t>29/04/2020</a:t>
             </a:fld>
             <a:endParaRPr kumimoji="0" lang="pt-BR" sz="1200" b="0" i="0" u="none" strike="noStrike" kern="1200" cap="none" spc="0" normalizeH="0" baseline="0" noProof="0">
               <a:ln>
@@ -32537,7 +32537,7 @@
                 <a:tabLst/>
                 <a:defRPr/>
               </a:pPr>
-              <a:t>28/04/2020</a:t>
+              <a:t>29/04/2020</a:t>
             </a:fld>
             <a:endParaRPr kumimoji="0" lang="pt-BR" sz="1200" b="0" i="0" u="none" strike="noStrike" kern="1200" cap="none" spc="0" normalizeH="0" baseline="0" noProof="0" smtClean="0">
               <a:ln>
@@ -33237,7 +33237,7 @@
                 <a:tabLst/>
                 <a:defRPr/>
               </a:pPr>
-              <a:t>28/04/2020</a:t>
+              <a:t>29/04/2020</a:t>
             </a:fld>
             <a:endParaRPr kumimoji="0" lang="pt-BR" sz="1200" b="0" i="0" u="none" strike="noStrike" kern="1200" cap="none" spc="0" normalizeH="0" baseline="0" noProof="0">
               <a:ln>
@@ -33937,7 +33937,7 @@
                 <a:tabLst/>
                 <a:defRPr/>
               </a:pPr>
-              <a:t>28/04/2020</a:t>
+              <a:t>29/04/2020</a:t>
             </a:fld>
             <a:endParaRPr kumimoji="0" lang="pt-BR" sz="1200" b="0" i="0" u="none" strike="noStrike" kern="1200" cap="none" spc="0" normalizeH="0" baseline="0" noProof="0">
               <a:ln>
@@ -37426,7 +37426,7 @@
         </p:nvSpPr>
         <p:spPr>
           <a:xfrm>
-            <a:off x="7185459" y="2073708"/>
+            <a:off x="7247715" y="1400377"/>
             <a:ext cx="1418878" cy="853854"/>
           </a:xfrm>
           <a:prstGeom prst="rect">
@@ -37504,120 +37504,90 @@
           </a:p>
         </p:txBody>
       </p:sp>
-      <p:grpSp>
-        <p:nvGrpSpPr>
-          <p:cNvPr id="13" name="Agrupar 12"/>
-          <p:cNvGrpSpPr/>
+      <p:cxnSp>
+        <p:nvCxnSpPr>
+          <p:cNvPr id="91" name="Conector em Curva 90"/>
+          <p:cNvCxnSpPr>
+            <a:stCxn id="5" idx="1"/>
+            <a:endCxn id="3" idx="3"/>
+          </p:cNvCxnSpPr>
           <p:nvPr/>
-        </p:nvGrpSpPr>
-        <p:grpSpPr>
+        </p:nvCxnSpPr>
+        <p:spPr>
+          <a:xfrm rot="10800000" flipV="1">
+            <a:off x="4759271" y="1827303"/>
+            <a:ext cx="2488445" cy="2308759"/>
+          </a:xfrm>
+          <a:prstGeom prst="curvedConnector3">
+            <a:avLst>
+              <a:gd name="adj1" fmla="val 50000"/>
+            </a:avLst>
+          </a:prstGeom>
+          <a:ln w="28575">
+            <a:solidFill>
+              <a:schemeClr val="tx1"/>
+            </a:solidFill>
+            <a:tailEnd type="triangle"/>
+          </a:ln>
+        </p:spPr>
+        <p:style>
+          <a:lnRef idx="1">
+            <a:schemeClr val="accent1"/>
+          </a:lnRef>
+          <a:fillRef idx="0">
+            <a:schemeClr val="accent1"/>
+          </a:fillRef>
+          <a:effectRef idx="0">
+            <a:schemeClr val="accent1"/>
+          </a:effectRef>
+          <a:fontRef idx="minor">
+            <a:schemeClr val="tx1"/>
+          </a:fontRef>
+        </p:style>
+      </p:cxnSp>
+      <p:sp>
+        <p:nvSpPr>
+          <p:cNvPr id="49" name="CaixaDeTexto 48"/>
+          <p:cNvSpPr txBox="1"/>
+          <p:nvPr/>
+        </p:nvSpPr>
+        <p:spPr>
           <a:xfrm>
-            <a:off x="3188369" y="2067990"/>
-            <a:ext cx="3997091" cy="3325835"/>
-            <a:chOff x="2693069" y="1286940"/>
-            <a:chExt cx="3997091" cy="3325835"/>
+            <a:off x="5258617" y="2429565"/>
+            <a:ext cx="1514231" cy="369332"/>
           </a:xfrm>
-        </p:grpSpPr>
-        <p:cxnSp>
-          <p:nvCxnSpPr>
-            <p:cNvPr id="91" name="Conector em Curva 90"/>
-            <p:cNvCxnSpPr>
-              <a:stCxn id="5" idx="1"/>
-              <a:endCxn id="3" idx="3"/>
-            </p:cNvCxnSpPr>
-            <p:nvPr/>
-          </p:nvCxnSpPr>
-          <p:spPr>
-            <a:xfrm rot="10800000" flipV="1">
-              <a:off x="4201715" y="1719584"/>
-              <a:ext cx="2488445" cy="2308759"/>
-            </a:xfrm>
-            <a:prstGeom prst="curvedConnector3">
-              <a:avLst>
-                <a:gd name="adj1" fmla="val 50000"/>
-              </a:avLst>
-            </a:prstGeom>
-            <a:ln w="28575">
-              <a:solidFill>
-                <a:schemeClr val="tx1"/>
-              </a:solidFill>
-              <a:tailEnd type="triangle"/>
-            </a:ln>
-          </p:spPr>
-          <p:style>
-            <a:lnRef idx="1">
-              <a:schemeClr val="accent1"/>
-            </a:lnRef>
-            <a:fillRef idx="0">
-              <a:schemeClr val="accent1"/>
-            </a:fillRef>
-            <a:effectRef idx="0">
-              <a:schemeClr val="accent1"/>
-            </a:effectRef>
-            <a:fontRef idx="minor">
-              <a:schemeClr val="tx1"/>
-            </a:fontRef>
-          </p:style>
-        </p:cxnSp>
-        <p:sp>
-          <p:nvSpPr>
-            <p:cNvPr id="49" name="CaixaDeTexto 48"/>
-            <p:cNvSpPr txBox="1"/>
-            <p:nvPr/>
-          </p:nvSpPr>
-          <p:spPr>
-            <a:xfrm>
-              <a:off x="4701061" y="2321846"/>
-              <a:ext cx="1514231" cy="369332"/>
-            </a:xfrm>
-            <a:prstGeom prst="rect">
-              <a:avLst/>
-            </a:prstGeom>
-            <a:solidFill>
-              <a:schemeClr val="bg1"/>
-            </a:solidFill>
-          </p:spPr>
-          <p:txBody>
-            <a:bodyPr wrap="square" rtlCol="0">
-              <a:spAutoFit/>
-            </a:bodyPr>
-            <a:lstStyle/>
-            <a:p>
-              <a:pPr marL="0" marR="0" lvl="0" indent="0" algn="ctr" defTabSz="914400" rtl="0" eaLnBrk="1" fontAlgn="auto" latinLnBrk="0" hangingPunct="1">
-                <a:lnSpc>
-                  <a:spcPct val="100000"/>
-                </a:lnSpc>
-                <a:spcBef>
-                  <a:spcPts val="0"/>
-                </a:spcBef>
-                <a:spcAft>
-                  <a:spcPts val="0"/>
-                </a:spcAft>
-                <a:buClrTx/>
-                <a:buSzTx/>
-                <a:buFontTx/>
-                <a:buNone/>
-                <a:tabLst/>
-                <a:defRPr/>
-              </a:pPr>
-              <a:r>
-                <a:rPr kumimoji="0" lang="pt-BR" sz="1800" b="0" i="0" u="none" strike="noStrike" kern="1200" cap="none" spc="0" normalizeH="0" baseline="0" noProof="0" dirty="0" smtClean="0">
-                  <a:ln>
-                    <a:noFill/>
-                  </a:ln>
-                  <a:solidFill>
-                    <a:prstClr val="black"/>
-                  </a:solidFill>
-                  <a:effectLst/>
-                  <a:uLnTx/>
-                  <a:uFillTx/>
-                  <a:latin typeface="Calibri" panose="020F0502020204030204"/>
-                  <a:ea typeface="+mn-ea"/>
-                  <a:cs typeface="+mn-cs"/>
-                </a:rPr>
-                <a:t>Convite</a:t>
-              </a:r>
-              <a:endParaRPr kumimoji="0" lang="pt-BR" sz="1800" b="0" i="0" u="none" strike="noStrike" kern="1200" cap="none" spc="0" normalizeH="0" baseline="0" noProof="0" dirty="0">
+          <a:prstGeom prst="rect">
+            <a:avLst/>
+          </a:prstGeom>
+          <a:solidFill>
+            <a:schemeClr val="bg1"/>
+          </a:solidFill>
+        </p:spPr>
+        <p:txBody>
+          <a:bodyPr wrap="square" rtlCol="0">
+            <a:spAutoFit/>
+          </a:bodyPr>
+          <a:lstStyle/>
+          <a:p>
+            <a:pPr marL="0" marR="0" lvl="0" indent="0" algn="ctr" defTabSz="914400" rtl="0" eaLnBrk="1" fontAlgn="auto" latinLnBrk="0" hangingPunct="1">
+              <a:lnSpc>
+                <a:spcPct val="100000"/>
+              </a:lnSpc>
+              <a:spcBef>
+                <a:spcPts val="0"/>
+              </a:spcBef>
+              <a:spcAft>
+                <a:spcPts val="0"/>
+              </a:spcAft>
+              <a:buClrTx/>
+              <a:buSzTx/>
+              <a:buFontTx/>
+              <a:buNone/>
+              <a:tabLst/>
+              <a:defRPr/>
+            </a:pPr>
+            <a:r>
+              <a:rPr kumimoji="0" lang="pt-BR" sz="1800" b="0" i="0" u="none" strike="noStrike" kern="1200" cap="none" spc="0" normalizeH="0" baseline="0" noProof="0" dirty="0" smtClean="0">
                 <a:ln>
                   <a:noFill/>
                 </a:ln>
@@ -37630,198 +37600,52 @@
                 <a:latin typeface="Calibri" panose="020F0502020204030204"/>
                 <a:ea typeface="+mn-ea"/>
                 <a:cs typeface="+mn-cs"/>
-              </a:endParaRPr>
-            </a:p>
-          </p:txBody>
-        </p:sp>
-        <p:grpSp>
-          <p:nvGrpSpPr>
-            <p:cNvPr id="4" name="Agrupar 3"/>
-            <p:cNvGrpSpPr/>
-            <p:nvPr/>
-          </p:nvGrpSpPr>
-          <p:grpSpPr>
-            <a:xfrm>
-              <a:off x="2693069" y="3172775"/>
-              <a:ext cx="1508645" cy="1440000"/>
-              <a:chOff x="4588544" y="3353750"/>
-              <a:chExt cx="1508645" cy="1440000"/>
-            </a:xfrm>
-          </p:grpSpPr>
-          <p:sp>
-            <p:nvSpPr>
-              <p:cNvPr id="9" name="Elipse 8"/>
-              <p:cNvSpPr/>
-              <p:nvPr/>
-            </p:nvSpPr>
-            <p:spPr>
-              <a:xfrm>
-                <a:off x="4622866" y="3353750"/>
-                <a:ext cx="1440000" cy="1440000"/>
-              </a:xfrm>
-              <a:prstGeom prst="ellipse">
-                <a:avLst/>
-              </a:prstGeom>
-            </p:spPr>
-            <p:style>
-              <a:lnRef idx="2">
-                <a:schemeClr val="accent1">
-                  <a:shade val="50000"/>
-                </a:schemeClr>
-              </a:lnRef>
-              <a:fillRef idx="1">
-                <a:schemeClr val="accent1"/>
-              </a:fillRef>
-              <a:effectRef idx="0">
-                <a:schemeClr val="accent1"/>
-              </a:effectRef>
-              <a:fontRef idx="minor">
-                <a:schemeClr val="lt1"/>
-              </a:fontRef>
-            </p:style>
-            <p:txBody>
-              <a:bodyPr rtlCol="0" anchor="ctr"/>
-              <a:lstStyle/>
-              <a:p>
-                <a:pPr marL="0" marR="0" lvl="0" indent="0" algn="ctr" defTabSz="914400" rtl="0" eaLnBrk="1" fontAlgn="auto" latinLnBrk="0" hangingPunct="1">
-                  <a:lnSpc>
-                    <a:spcPct val="100000"/>
-                  </a:lnSpc>
-                  <a:spcBef>
-                    <a:spcPts val="0"/>
-                  </a:spcBef>
-                  <a:spcAft>
-                    <a:spcPts val="0"/>
-                  </a:spcAft>
-                  <a:buClrTx/>
-                  <a:buSzTx/>
-                  <a:buFontTx/>
-                  <a:buNone/>
-                  <a:tabLst/>
-                  <a:defRPr/>
-                </a:pPr>
-                <a:endParaRPr kumimoji="0" lang="pt-BR" sz="1200" b="0" i="0" u="none" strike="noStrike" kern="1200" cap="none" spc="0" normalizeH="0" baseline="0" noProof="0" dirty="0">
-                  <a:ln>
-                    <a:noFill/>
-                  </a:ln>
-                  <a:solidFill>
-                    <a:prstClr val="white"/>
-                  </a:solidFill>
-                  <a:effectLst/>
-                  <a:uLnTx/>
-                  <a:uFillTx/>
-                  <a:latin typeface="Calibri" panose="020F0502020204030204"/>
-                  <a:ea typeface="+mn-ea"/>
-                  <a:cs typeface="+mn-cs"/>
-                </a:endParaRPr>
-              </a:p>
-            </p:txBody>
-          </p:sp>
-          <p:sp>
-            <p:nvSpPr>
-              <p:cNvPr id="3" name="CaixaDeTexto 2"/>
-              <p:cNvSpPr txBox="1"/>
-              <p:nvPr/>
-            </p:nvSpPr>
-            <p:spPr>
-              <a:xfrm>
-                <a:off x="4588544" y="3778432"/>
-                <a:ext cx="1508645" cy="861774"/>
-              </a:xfrm>
-              <a:prstGeom prst="rect">
-                <a:avLst/>
-              </a:prstGeom>
-              <a:noFill/>
-            </p:spPr>
-            <p:txBody>
-              <a:bodyPr wrap="square" rtlCol="0" anchor="b">
-                <a:spAutoFit/>
-              </a:bodyPr>
-              <a:lstStyle/>
-              <a:p>
-                <a:pPr marL="0" marR="0" lvl="0" indent="0" algn="ctr" defTabSz="914400" rtl="0" eaLnBrk="1" fontAlgn="auto" latinLnBrk="0" hangingPunct="1">
-                  <a:lnSpc>
-                    <a:spcPct val="100000"/>
-                  </a:lnSpc>
-                  <a:spcBef>
-                    <a:spcPts val="0"/>
-                  </a:spcBef>
-                  <a:spcAft>
-                    <a:spcPts val="0"/>
-                  </a:spcAft>
-                  <a:buClrTx/>
-                  <a:buSzTx/>
-                  <a:buFontTx/>
-                  <a:buNone/>
-                  <a:tabLst/>
-                  <a:defRPr/>
-                </a:pPr>
-                <a:r>
-                  <a:rPr kumimoji="0" lang="pt-BR" sz="1600" b="0" i="0" u="none" strike="noStrike" kern="1200" cap="none" spc="0" normalizeH="0" baseline="0" noProof="0" dirty="0" smtClean="0">
-                    <a:ln>
-                      <a:noFill/>
-                    </a:ln>
-                    <a:solidFill>
-                      <a:prstClr val="white"/>
-                    </a:solidFill>
-                    <a:effectLst/>
-                    <a:uLnTx/>
-                    <a:uFillTx/>
-                    <a:latin typeface="Calibri" panose="020F0502020204030204"/>
-                    <a:ea typeface="+mn-ea"/>
-                    <a:cs typeface="+mn-cs"/>
-                  </a:rPr>
-                  <a:t>Receber convidados</a:t>
-                </a:r>
-              </a:p>
-              <a:p>
-                <a:pPr marL="0" marR="0" lvl="0" indent="0" algn="l" defTabSz="914400" rtl="0" eaLnBrk="1" fontAlgn="auto" latinLnBrk="0" hangingPunct="1">
-                  <a:lnSpc>
-                    <a:spcPct val="100000"/>
-                  </a:lnSpc>
-                  <a:spcBef>
-                    <a:spcPts val="0"/>
-                  </a:spcBef>
-                  <a:spcAft>
-                    <a:spcPts val="0"/>
-                  </a:spcAft>
-                  <a:buClrTx/>
-                  <a:buSzTx/>
-                  <a:buFontTx/>
-                  <a:buNone/>
-                  <a:tabLst/>
-                  <a:defRPr/>
-                </a:pPr>
-                <a:endParaRPr kumimoji="0" lang="pt-BR" sz="1800" b="0" i="0" u="none" strike="noStrike" kern="1200" cap="none" spc="0" normalizeH="0" baseline="0" noProof="0" dirty="0" smtClean="0">
-                  <a:ln>
-                    <a:noFill/>
-                  </a:ln>
-                  <a:solidFill>
-                    <a:prstClr val="black"/>
-                  </a:solidFill>
-                  <a:effectLst/>
-                  <a:uLnTx/>
-                  <a:uFillTx/>
-                  <a:latin typeface="Calibri" panose="020F0502020204030204"/>
-                  <a:ea typeface="+mn-ea"/>
-                  <a:cs typeface="+mn-cs"/>
-                </a:endParaRPr>
-              </a:p>
-            </p:txBody>
-          </p:sp>
-        </p:grpSp>
+              </a:rPr>
+              <a:t>Convite</a:t>
+            </a:r>
+            <a:endParaRPr kumimoji="0" lang="pt-BR" sz="1800" b="0" i="0" u="none" strike="noStrike" kern="1200" cap="none" spc="0" normalizeH="0" baseline="0" noProof="0" dirty="0">
+              <a:ln>
+                <a:noFill/>
+              </a:ln>
+              <a:solidFill>
+                <a:prstClr val="black"/>
+              </a:solidFill>
+              <a:effectLst/>
+              <a:uLnTx/>
+              <a:uFillTx/>
+              <a:latin typeface="Calibri" panose="020F0502020204030204"/>
+              <a:ea typeface="+mn-ea"/>
+              <a:cs typeface="+mn-cs"/>
+            </a:endParaRPr>
+          </a:p>
+        </p:txBody>
+      </p:sp>
+      <p:grpSp>
+        <p:nvGrpSpPr>
+          <p:cNvPr id="4" name="Agrupar 3"/>
+          <p:cNvGrpSpPr/>
+          <p:nvPr/>
+        </p:nvGrpSpPr>
+        <p:grpSpPr>
+          <a:xfrm>
+            <a:off x="3250625" y="3280494"/>
+            <a:ext cx="1508645" cy="1440000"/>
+            <a:chOff x="4588544" y="3353750"/>
+            <a:chExt cx="1508645" cy="1440000"/>
+          </a:xfrm>
+        </p:grpSpPr>
         <p:sp>
           <p:nvSpPr>
-            <p:cNvPr id="27" name="Retângulo 26"/>
+            <p:cNvPr id="9" name="Elipse 8"/>
             <p:cNvSpPr/>
             <p:nvPr/>
           </p:nvSpPr>
           <p:spPr>
             <a:xfrm>
-              <a:off x="2737952" y="1286940"/>
-              <a:ext cx="1418878" cy="853854"/>
+              <a:off x="4622866" y="3353750"/>
+              <a:ext cx="1440000" cy="1440000"/>
             </a:xfrm>
-            <a:prstGeom prst="rect">
+            <a:prstGeom prst="ellipse">
               <a:avLst/>
             </a:prstGeom>
           </p:spPr>
@@ -37862,24 +37686,7 @@
                 <a:tabLst/>
                 <a:defRPr/>
               </a:pPr>
-              <a:r>
-                <a:rPr kumimoji="0" lang="pt-BR" sz="1600" b="0" i="0" u="none" strike="noStrike" kern="1200" cap="none" spc="0" normalizeH="0" baseline="0" noProof="0" dirty="0" smtClean="0">
-                  <a:ln>
-                    <a:noFill/>
-                  </a:ln>
-                  <a:solidFill>
-                    <a:prstClr val="white"/>
-                  </a:solidFill>
-                  <a:effectLst/>
-                  <a:uLnTx/>
-                  <a:uFillTx/>
-                  <a:latin typeface="Calibri" panose="020F0502020204030204"/>
-                  <a:ea typeface="+mn-ea"/>
-                  <a:cs typeface="+mn-cs"/>
-                </a:rPr>
-                <a:t>Contratante</a:t>
-              </a:r>
-              <a:endParaRPr kumimoji="0" lang="pt-BR" sz="1800" b="0" i="0" u="none" strike="noStrike" kern="1200" cap="none" spc="0" normalizeH="0" baseline="0" noProof="0" dirty="0">
+              <a:endParaRPr kumimoji="0" lang="pt-BR" sz="1200" b="0" i="0" u="none" strike="noStrike" kern="1200" cap="none" spc="0" normalizeH="0" baseline="0" noProof="0" dirty="0">
                 <a:ln>
                   <a:noFill/>
                 </a:ln>
@@ -37896,65 +37703,24 @@
             </a:p>
           </p:txBody>
         </p:sp>
-        <p:cxnSp>
-          <p:nvCxnSpPr>
-            <p:cNvPr id="7" name="Conector de Seta Reta 6"/>
-            <p:cNvCxnSpPr>
-              <a:stCxn id="27" idx="2"/>
-              <a:endCxn id="9" idx="0"/>
-            </p:cNvCxnSpPr>
-            <p:nvPr/>
-          </p:nvCxnSpPr>
-          <p:spPr>
-            <a:xfrm>
-              <a:off x="3447391" y="2140794"/>
-              <a:ext cx="0" cy="1031981"/>
-            </a:xfrm>
-            <a:prstGeom prst="straightConnector1">
-              <a:avLst/>
-            </a:prstGeom>
-            <a:ln w="28575">
-              <a:solidFill>
-                <a:schemeClr val="tx1"/>
-              </a:solidFill>
-              <a:tailEnd type="triangle"/>
-            </a:ln>
-          </p:spPr>
-          <p:style>
-            <a:lnRef idx="1">
-              <a:schemeClr val="accent1"/>
-            </a:lnRef>
-            <a:fillRef idx="0">
-              <a:schemeClr val="accent1"/>
-            </a:fillRef>
-            <a:effectRef idx="0">
-              <a:schemeClr val="accent1"/>
-            </a:effectRef>
-            <a:fontRef idx="minor">
-              <a:schemeClr val="tx1"/>
-            </a:fontRef>
-          </p:style>
-        </p:cxnSp>
         <p:sp>
           <p:nvSpPr>
-            <p:cNvPr id="31" name="CaixaDeTexto 30"/>
+            <p:cNvPr id="3" name="CaixaDeTexto 2"/>
             <p:cNvSpPr txBox="1"/>
             <p:nvPr/>
           </p:nvSpPr>
           <p:spPr>
             <a:xfrm>
-              <a:off x="2693069" y="2321846"/>
-              <a:ext cx="1514231" cy="646331"/>
+              <a:off x="4588544" y="3778432"/>
+              <a:ext cx="1508645" cy="861774"/>
             </a:xfrm>
             <a:prstGeom prst="rect">
               <a:avLst/>
             </a:prstGeom>
-            <a:solidFill>
-              <a:schemeClr val="bg1"/>
-            </a:solidFill>
+            <a:noFill/>
           </p:spPr>
           <p:txBody>
-            <a:bodyPr wrap="square" rtlCol="0">
+            <a:bodyPr wrap="square" rtlCol="0" anchor="b">
               <a:spAutoFit/>
             </a:bodyPr>
             <a:lstStyle/>
@@ -37977,12 +37743,12 @@
                 <a:defRPr/>
               </a:pPr>
               <a:r>
-                <a:rPr kumimoji="0" lang="pt-BR" sz="1800" b="0" i="0" u="none" strike="noStrike" kern="1200" cap="none" spc="0" normalizeH="0" baseline="0" noProof="0" dirty="0" smtClean="0">
+                <a:rPr kumimoji="0" lang="pt-BR" sz="1600" b="0" i="0" u="none" strike="noStrike" kern="1200" cap="none" spc="0" normalizeH="0" baseline="0" noProof="0" dirty="0" smtClean="0">
                   <a:ln>
                     <a:noFill/>
                   </a:ln>
                   <a:solidFill>
-                    <a:prstClr val="black"/>
+                    <a:prstClr val="white"/>
                   </a:solidFill>
                   <a:effectLst/>
                   <a:uLnTx/>
@@ -37990,6 +37756,382 @@
                   <a:latin typeface="Calibri" panose="020F0502020204030204"/>
                   <a:ea typeface="+mn-ea"/>
                   <a:cs typeface="+mn-cs"/>
+                </a:rPr>
+                <a:t>Receber convidados</a:t>
+              </a:r>
+            </a:p>
+            <a:p>
+              <a:pPr marL="0" marR="0" lvl="0" indent="0" algn="l" defTabSz="914400" rtl="0" eaLnBrk="1" fontAlgn="auto" latinLnBrk="0" hangingPunct="1">
+                <a:lnSpc>
+                  <a:spcPct val="100000"/>
+                </a:lnSpc>
+                <a:spcBef>
+                  <a:spcPts val="0"/>
+                </a:spcBef>
+                <a:spcAft>
+                  <a:spcPts val="0"/>
+                </a:spcAft>
+                <a:buClrTx/>
+                <a:buSzTx/>
+                <a:buFontTx/>
+                <a:buNone/>
+                <a:tabLst/>
+                <a:defRPr/>
+              </a:pPr>
+              <a:endParaRPr kumimoji="0" lang="pt-BR" sz="1800" b="0" i="0" u="none" strike="noStrike" kern="1200" cap="none" spc="0" normalizeH="0" baseline="0" noProof="0" dirty="0" smtClean="0">
+                <a:ln>
+                  <a:noFill/>
+                </a:ln>
+                <a:solidFill>
+                  <a:prstClr val="black"/>
+                </a:solidFill>
+                <a:effectLst/>
+                <a:uLnTx/>
+                <a:uFillTx/>
+                <a:latin typeface="Calibri" panose="020F0502020204030204"/>
+                <a:ea typeface="+mn-ea"/>
+                <a:cs typeface="+mn-cs"/>
+              </a:endParaRPr>
+            </a:p>
+          </p:txBody>
+        </p:sp>
+      </p:grpSp>
+      <p:sp>
+        <p:nvSpPr>
+          <p:cNvPr id="27" name="Retângulo 26"/>
+          <p:cNvSpPr/>
+          <p:nvPr/>
+        </p:nvSpPr>
+        <p:spPr>
+          <a:xfrm>
+            <a:off x="3295508" y="1394659"/>
+            <a:ext cx="1418878" cy="853854"/>
+          </a:xfrm>
+          <a:prstGeom prst="rect">
+            <a:avLst/>
+          </a:prstGeom>
+        </p:spPr>
+        <p:style>
+          <a:lnRef idx="2">
+            <a:schemeClr val="accent1">
+              <a:shade val="50000"/>
+            </a:schemeClr>
+          </a:lnRef>
+          <a:fillRef idx="1">
+            <a:schemeClr val="accent1"/>
+          </a:fillRef>
+          <a:effectRef idx="0">
+            <a:schemeClr val="accent1"/>
+          </a:effectRef>
+          <a:fontRef idx="minor">
+            <a:schemeClr val="lt1"/>
+          </a:fontRef>
+        </p:style>
+        <p:txBody>
+          <a:bodyPr rtlCol="0" anchor="ctr"/>
+          <a:lstStyle/>
+          <a:p>
+            <a:pPr marL="0" marR="0" lvl="0" indent="0" algn="ctr" defTabSz="914400" rtl="0" eaLnBrk="1" fontAlgn="auto" latinLnBrk="0" hangingPunct="1">
+              <a:lnSpc>
+                <a:spcPct val="100000"/>
+              </a:lnSpc>
+              <a:spcBef>
+                <a:spcPts val="0"/>
+              </a:spcBef>
+              <a:spcAft>
+                <a:spcPts val="0"/>
+              </a:spcAft>
+              <a:buClrTx/>
+              <a:buSzTx/>
+              <a:buFontTx/>
+              <a:buNone/>
+              <a:tabLst/>
+              <a:defRPr/>
+            </a:pPr>
+            <a:r>
+              <a:rPr kumimoji="0" lang="pt-BR" sz="1600" b="0" i="0" u="none" strike="noStrike" kern="1200" cap="none" spc="0" normalizeH="0" baseline="0" noProof="0" dirty="0" smtClean="0">
+                <a:ln>
+                  <a:noFill/>
+                </a:ln>
+                <a:solidFill>
+                  <a:prstClr val="white"/>
+                </a:solidFill>
+                <a:effectLst/>
+                <a:uLnTx/>
+                <a:uFillTx/>
+                <a:latin typeface="Calibri" panose="020F0502020204030204"/>
+                <a:ea typeface="+mn-ea"/>
+                <a:cs typeface="+mn-cs"/>
+              </a:rPr>
+              <a:t>Contratante</a:t>
+            </a:r>
+            <a:endParaRPr kumimoji="0" lang="pt-BR" sz="1800" b="0" i="0" u="none" strike="noStrike" kern="1200" cap="none" spc="0" normalizeH="0" baseline="0" noProof="0" dirty="0">
+              <a:ln>
+                <a:noFill/>
+              </a:ln>
+              <a:solidFill>
+                <a:prstClr val="white"/>
+              </a:solidFill>
+              <a:effectLst/>
+              <a:uLnTx/>
+              <a:uFillTx/>
+              <a:latin typeface="Calibri" panose="020F0502020204030204"/>
+              <a:ea typeface="+mn-ea"/>
+              <a:cs typeface="+mn-cs"/>
+            </a:endParaRPr>
+          </a:p>
+        </p:txBody>
+      </p:sp>
+      <p:cxnSp>
+        <p:nvCxnSpPr>
+          <p:cNvPr id="7" name="Conector de Seta Reta 6"/>
+          <p:cNvCxnSpPr>
+            <a:stCxn id="27" idx="2"/>
+            <a:endCxn id="9" idx="0"/>
+          </p:cNvCxnSpPr>
+          <p:nvPr/>
+        </p:nvCxnSpPr>
+        <p:spPr>
+          <a:xfrm>
+            <a:off x="4004947" y="2248513"/>
+            <a:ext cx="0" cy="1031981"/>
+          </a:xfrm>
+          <a:prstGeom prst="straightConnector1">
+            <a:avLst/>
+          </a:prstGeom>
+          <a:ln w="28575">
+            <a:solidFill>
+              <a:schemeClr val="tx1"/>
+            </a:solidFill>
+            <a:tailEnd type="triangle"/>
+          </a:ln>
+        </p:spPr>
+        <p:style>
+          <a:lnRef idx="1">
+            <a:schemeClr val="accent1"/>
+          </a:lnRef>
+          <a:fillRef idx="0">
+            <a:schemeClr val="accent1"/>
+          </a:fillRef>
+          <a:effectRef idx="0">
+            <a:schemeClr val="accent1"/>
+          </a:effectRef>
+          <a:fontRef idx="minor">
+            <a:schemeClr val="tx1"/>
+          </a:fontRef>
+        </p:style>
+      </p:cxnSp>
+      <p:sp>
+        <p:nvSpPr>
+          <p:cNvPr id="31" name="CaixaDeTexto 30"/>
+          <p:cNvSpPr txBox="1"/>
+          <p:nvPr/>
+        </p:nvSpPr>
+        <p:spPr>
+          <a:xfrm>
+            <a:off x="3250625" y="2429565"/>
+            <a:ext cx="1514231" cy="646331"/>
+          </a:xfrm>
+          <a:prstGeom prst="rect">
+            <a:avLst/>
+          </a:prstGeom>
+          <a:solidFill>
+            <a:schemeClr val="bg1"/>
+          </a:solidFill>
+        </p:spPr>
+        <p:txBody>
+          <a:bodyPr wrap="square" rtlCol="0">
+            <a:spAutoFit/>
+          </a:bodyPr>
+          <a:lstStyle/>
+          <a:p>
+            <a:pPr marL="0" marR="0" lvl="0" indent="0" algn="ctr" defTabSz="914400" rtl="0" eaLnBrk="1" fontAlgn="auto" latinLnBrk="0" hangingPunct="1">
+              <a:lnSpc>
+                <a:spcPct val="100000"/>
+              </a:lnSpc>
+              <a:spcBef>
+                <a:spcPts val="0"/>
+              </a:spcBef>
+              <a:spcAft>
+                <a:spcPts val="0"/>
+              </a:spcAft>
+              <a:buClrTx/>
+              <a:buSzTx/>
+              <a:buFontTx/>
+              <a:buNone/>
+              <a:tabLst/>
+              <a:defRPr/>
+            </a:pPr>
+            <a:r>
+              <a:rPr kumimoji="0" lang="pt-BR" sz="1800" b="0" i="0" u="none" strike="noStrike" kern="1200" cap="none" spc="0" normalizeH="0" baseline="0" noProof="0" dirty="0" smtClean="0">
+                <a:ln>
+                  <a:noFill/>
+                </a:ln>
+                <a:solidFill>
+                  <a:prstClr val="black"/>
+                </a:solidFill>
+                <a:effectLst/>
+                <a:uLnTx/>
+                <a:uFillTx/>
+                <a:latin typeface="Calibri" panose="020F0502020204030204"/>
+                <a:ea typeface="+mn-ea"/>
+                <a:cs typeface="+mn-cs"/>
+              </a:rPr>
+              <a:t>Lista de convidados</a:t>
+            </a:r>
+            <a:endParaRPr kumimoji="0" lang="pt-BR" sz="1800" b="0" i="0" u="none" strike="noStrike" kern="1200" cap="none" spc="0" normalizeH="0" baseline="0" noProof="0" dirty="0">
+              <a:ln>
+                <a:noFill/>
+              </a:ln>
+              <a:solidFill>
+                <a:prstClr val="black"/>
+              </a:solidFill>
+              <a:effectLst/>
+              <a:uLnTx/>
+              <a:uFillTx/>
+              <a:latin typeface="Calibri" panose="020F0502020204030204"/>
+              <a:ea typeface="+mn-ea"/>
+              <a:cs typeface="+mn-cs"/>
+            </a:endParaRPr>
+          </a:p>
+        </p:txBody>
+      </p:sp>
+      <p:grpSp>
+        <p:nvGrpSpPr>
+          <p:cNvPr id="14" name="Agrupar 13"/>
+          <p:cNvGrpSpPr/>
+          <p:nvPr/>
+        </p:nvGrpSpPr>
+        <p:grpSpPr>
+          <a:xfrm>
+            <a:off x="3000471" y="5768631"/>
+            <a:ext cx="2008948" cy="548258"/>
+            <a:chOff x="4129678" y="1093123"/>
+            <a:chExt cx="1882172" cy="407324"/>
+          </a:xfrm>
+        </p:grpSpPr>
+        <p:grpSp>
+          <p:nvGrpSpPr>
+            <p:cNvPr id="15" name="Agrupar 14"/>
+            <p:cNvGrpSpPr/>
+            <p:nvPr/>
+          </p:nvGrpSpPr>
+          <p:grpSpPr>
+            <a:xfrm>
+              <a:off x="4422373" y="1093123"/>
+              <a:ext cx="1296785" cy="407324"/>
+              <a:chOff x="914399" y="58189"/>
+              <a:chExt cx="1296785" cy="407324"/>
+            </a:xfrm>
+          </p:grpSpPr>
+          <p:cxnSp>
+            <p:nvCxnSpPr>
+              <p:cNvPr id="17" name="Conector reto 16"/>
+              <p:cNvCxnSpPr/>
+              <p:nvPr/>
+            </p:nvCxnSpPr>
+            <p:spPr>
+              <a:xfrm>
+                <a:off x="914399" y="457200"/>
+                <a:ext cx="1296785" cy="8313"/>
+              </a:xfrm>
+              <a:prstGeom prst="line">
+                <a:avLst/>
+              </a:prstGeom>
+              <a:ln w="28575"/>
+            </p:spPr>
+            <p:style>
+              <a:lnRef idx="1">
+                <a:schemeClr val="accent1"/>
+              </a:lnRef>
+              <a:fillRef idx="0">
+                <a:schemeClr val="accent1"/>
+              </a:fillRef>
+              <a:effectRef idx="0">
+                <a:schemeClr val="accent1"/>
+              </a:effectRef>
+              <a:fontRef idx="minor">
+                <a:schemeClr val="tx1"/>
+              </a:fontRef>
+            </p:style>
+          </p:cxnSp>
+          <p:cxnSp>
+            <p:nvCxnSpPr>
+              <p:cNvPr id="18" name="Conector reto 17"/>
+              <p:cNvCxnSpPr/>
+              <p:nvPr/>
+            </p:nvCxnSpPr>
+            <p:spPr>
+              <a:xfrm>
+                <a:off x="914399" y="58189"/>
+                <a:ext cx="1296785" cy="8313"/>
+              </a:xfrm>
+              <a:prstGeom prst="line">
+                <a:avLst/>
+              </a:prstGeom>
+              <a:ln w="28575"/>
+            </p:spPr>
+            <p:style>
+              <a:lnRef idx="1">
+                <a:schemeClr val="accent1"/>
+              </a:lnRef>
+              <a:fillRef idx="0">
+                <a:schemeClr val="accent1"/>
+              </a:fillRef>
+              <a:effectRef idx="0">
+                <a:schemeClr val="accent1"/>
+              </a:effectRef>
+              <a:fontRef idx="minor">
+                <a:schemeClr val="tx1"/>
+              </a:fontRef>
+            </p:style>
+          </p:cxnSp>
+        </p:grpSp>
+        <p:sp>
+          <p:nvSpPr>
+            <p:cNvPr id="16" name="CaixaDeTexto 15"/>
+            <p:cNvSpPr txBox="1"/>
+            <p:nvPr/>
+          </p:nvSpPr>
+          <p:spPr>
+            <a:xfrm>
+              <a:off x="4129678" y="1159589"/>
+              <a:ext cx="1882172" cy="274392"/>
+            </a:xfrm>
+            <a:prstGeom prst="rect">
+              <a:avLst/>
+            </a:prstGeom>
+            <a:noFill/>
+          </p:spPr>
+          <p:txBody>
+            <a:bodyPr wrap="none" rtlCol="0">
+              <a:spAutoFit/>
+            </a:bodyPr>
+            <a:lstStyle/>
+            <a:p>
+              <a:pPr marL="0" marR="0" lvl="0" indent="0" algn="l" defTabSz="914400" rtl="0" eaLnBrk="1" fontAlgn="auto" latinLnBrk="0" hangingPunct="1">
+                <a:lnSpc>
+                  <a:spcPct val="100000"/>
+                </a:lnSpc>
+                <a:spcBef>
+                  <a:spcPts val="0"/>
+                </a:spcBef>
+                <a:spcAft>
+                  <a:spcPts val="0"/>
+                </a:spcAft>
+                <a:buClrTx/>
+                <a:buSzTx/>
+                <a:buFontTx/>
+                <a:buNone/>
+                <a:tabLst/>
+                <a:defRPr/>
+              </a:pPr>
+              <a:r>
+                <a:rPr lang="pt-BR" noProof="0" dirty="0" smtClean="0">
+                  <a:solidFill>
+                    <a:prstClr val="black"/>
+                  </a:solidFill>
+                  <a:latin typeface="Calibri" panose="020F0502020204030204"/>
                 </a:rPr>
                 <a:t>Lista de convidados</a:t>
               </a:r>
@@ -38011,6 +38153,45 @@
           </p:txBody>
         </p:sp>
       </p:grpSp>
+      <p:cxnSp>
+        <p:nvCxnSpPr>
+          <p:cNvPr id="11" name="Conector de Seta Reta 10"/>
+          <p:cNvCxnSpPr>
+            <a:stCxn id="9" idx="4"/>
+          </p:cNvCxnSpPr>
+          <p:nvPr/>
+        </p:nvCxnSpPr>
+        <p:spPr>
+          <a:xfrm flipH="1">
+            <a:off x="4004945" y="4720494"/>
+            <a:ext cx="2" cy="1048137"/>
+          </a:xfrm>
+          <a:prstGeom prst="straightConnector1">
+            <a:avLst/>
+          </a:prstGeom>
+          <a:ln w="28575">
+            <a:solidFill>
+              <a:schemeClr val="tx1"/>
+            </a:solidFill>
+            <a:headEnd type="triangle"/>
+            <a:tailEnd type="triangle"/>
+          </a:ln>
+        </p:spPr>
+        <p:style>
+          <a:lnRef idx="1">
+            <a:schemeClr val="accent1"/>
+          </a:lnRef>
+          <a:fillRef idx="0">
+            <a:schemeClr val="accent1"/>
+          </a:fillRef>
+          <a:effectRef idx="0">
+            <a:schemeClr val="accent1"/>
+          </a:effectRef>
+          <a:fontRef idx="minor">
+            <a:schemeClr val="tx1"/>
+          </a:fontRef>
+        </p:style>
+      </p:cxnSp>
     </p:spTree>
     <p:extLst>
       <p:ext uri="{BB962C8B-B14F-4D97-AF65-F5344CB8AC3E}">
@@ -44117,16 +44298,7 @@
                   </a:solidFill>
                   <a:latin typeface="Calibri" panose="020F0502020204030204"/>
                 </a:rPr>
-                <a:t>Receber </a:t>
-              </a:r>
-              <a:r>
-                <a:rPr lang="pt-BR" sz="1430" dirty="0" smtClean="0">
-                  <a:solidFill>
-                    <a:prstClr val="white"/>
-                  </a:solidFill>
-                  <a:latin typeface="Calibri" panose="020F0502020204030204"/>
-                </a:rPr>
-                <a:t>produtos</a:t>
+                <a:t>Receber produtos</a:t>
               </a:r>
               <a:endParaRPr kumimoji="0" lang="pt-BR" sz="1430" b="0" i="0" u="none" strike="noStrike" kern="1200" cap="none" spc="0" normalizeH="0" baseline="0" noProof="0" dirty="0">
                 <a:ln>
@@ -45000,24 +45172,7 @@
                 <a:ea typeface="+mn-ea"/>
                 <a:cs typeface="+mn-cs"/>
               </a:rPr>
-              <a:t> </a:t>
-            </a:r>
-            <a:r>
-              <a:rPr kumimoji="0" lang="pt-BR" sz="1600" b="0" i="0" u="none" strike="noStrike" kern="1200" cap="none" spc="0" normalizeH="0" baseline="0" noProof="0" dirty="0" smtClean="0">
-                <a:ln>
-                  <a:noFill/>
-                </a:ln>
-                <a:solidFill>
-                  <a:prstClr val="white"/>
-                </a:solidFill>
-                <a:effectLst/>
-                <a:uLnTx/>
-                <a:uFillTx/>
-                <a:latin typeface="Calibri" panose="020F0502020204030204"/>
-                <a:ea typeface="+mn-ea"/>
-                <a:cs typeface="+mn-cs"/>
-              </a:rPr>
-              <a:t>pedido</a:t>
+              <a:t> pedido</a:t>
             </a:r>
             <a:endParaRPr kumimoji="0" lang="pt-BR" sz="1600" b="0" i="0" u="none" strike="noStrike" kern="1200" cap="none" spc="0" normalizeH="0" baseline="0" noProof="0" dirty="0">
               <a:ln>

</xml_diff>

<commit_message>
Artefato 21 e correção do 16
</commit_message>
<xml_diff>
--- a/Artefatos/16. Diagramas de Fluxo de Dados.pptx
+++ b/Artefatos/16. Diagramas de Fluxo de Dados.pptx
@@ -170,7 +170,7 @@
       </p14:sectionLst>
     </p:ext>
     <p:ext uri="{EFAFB233-063F-42B5-8137-9DF3F51BA10A}">
-      <p15:sldGuideLst xmlns:p15="http://schemas.microsoft.com/office/powerpoint/2012/main"/>
+      <p15:sldGuideLst xmlns:p15="http://schemas.microsoft.com/office/powerpoint/2012/main" xmlns=""/>
     </p:ext>
   </p:extLst>
 </p:presentation>
@@ -307,7 +307,7 @@
           <a:p>
             <a:fld id="{4DBD1E3A-4E22-4317-B6F0-1BA28CFB09D2}" type="datetimeFigureOut">
               <a:rPr lang="pt-BR" smtClean="0"/>
-              <a:t>29/04/2020</a:t>
+              <a:t>02/05/2020</a:t>
             </a:fld>
             <a:endParaRPr lang="pt-BR"/>
           </a:p>
@@ -477,7 +477,7 @@
           <a:p>
             <a:fld id="{4DBD1E3A-4E22-4317-B6F0-1BA28CFB09D2}" type="datetimeFigureOut">
               <a:rPr lang="pt-BR" smtClean="0"/>
-              <a:t>29/04/2020</a:t>
+              <a:t>02/05/2020</a:t>
             </a:fld>
             <a:endParaRPr lang="pt-BR"/>
           </a:p>
@@ -657,7 +657,7 @@
           <a:p>
             <a:fld id="{4DBD1E3A-4E22-4317-B6F0-1BA28CFB09D2}" type="datetimeFigureOut">
               <a:rPr lang="pt-BR" smtClean="0"/>
-              <a:t>29/04/2020</a:t>
+              <a:t>02/05/2020</a:t>
             </a:fld>
             <a:endParaRPr lang="pt-BR"/>
           </a:p>
@@ -849,7 +849,7 @@
           <a:p>
             <a:fld id="{4DBD1E3A-4E22-4317-B6F0-1BA28CFB09D2}" type="datetimeFigureOut">
               <a:rPr lang="pt-BR" smtClean="0"/>
-              <a:t>29/04/2020</a:t>
+              <a:t>02/05/2020</a:t>
             </a:fld>
             <a:endParaRPr lang="pt-BR"/>
           </a:p>
@@ -1019,7 +1019,7 @@
           <a:p>
             <a:fld id="{4DBD1E3A-4E22-4317-B6F0-1BA28CFB09D2}" type="datetimeFigureOut">
               <a:rPr lang="pt-BR" smtClean="0"/>
-              <a:t>29/04/2020</a:t>
+              <a:t>02/05/2020</a:t>
             </a:fld>
             <a:endParaRPr lang="pt-BR"/>
           </a:p>
@@ -1265,7 +1265,7 @@
           <a:p>
             <a:fld id="{4DBD1E3A-4E22-4317-B6F0-1BA28CFB09D2}" type="datetimeFigureOut">
               <a:rPr lang="pt-BR" smtClean="0"/>
-              <a:t>29/04/2020</a:t>
+              <a:t>02/05/2020</a:t>
             </a:fld>
             <a:endParaRPr lang="pt-BR"/>
           </a:p>
@@ -1497,7 +1497,7 @@
           <a:p>
             <a:fld id="{4DBD1E3A-4E22-4317-B6F0-1BA28CFB09D2}" type="datetimeFigureOut">
               <a:rPr lang="pt-BR" smtClean="0"/>
-              <a:t>29/04/2020</a:t>
+              <a:t>02/05/2020</a:t>
             </a:fld>
             <a:endParaRPr lang="pt-BR"/>
           </a:p>
@@ -1864,7 +1864,7 @@
           <a:p>
             <a:fld id="{4DBD1E3A-4E22-4317-B6F0-1BA28CFB09D2}" type="datetimeFigureOut">
               <a:rPr lang="pt-BR" smtClean="0"/>
-              <a:t>29/04/2020</a:t>
+              <a:t>02/05/2020</a:t>
             </a:fld>
             <a:endParaRPr lang="pt-BR"/>
           </a:p>
@@ -1982,7 +1982,7 @@
           <a:p>
             <a:fld id="{4DBD1E3A-4E22-4317-B6F0-1BA28CFB09D2}" type="datetimeFigureOut">
               <a:rPr lang="pt-BR" smtClean="0"/>
-              <a:t>29/04/2020</a:t>
+              <a:t>02/05/2020</a:t>
             </a:fld>
             <a:endParaRPr lang="pt-BR"/>
           </a:p>
@@ -2077,7 +2077,7 @@
           <a:p>
             <a:fld id="{4DBD1E3A-4E22-4317-B6F0-1BA28CFB09D2}" type="datetimeFigureOut">
               <a:rPr lang="pt-BR" smtClean="0"/>
-              <a:t>29/04/2020</a:t>
+              <a:t>02/05/2020</a:t>
             </a:fld>
             <a:endParaRPr lang="pt-BR"/>
           </a:p>
@@ -2354,7 +2354,7 @@
           <a:p>
             <a:fld id="{4DBD1E3A-4E22-4317-B6F0-1BA28CFB09D2}" type="datetimeFigureOut">
               <a:rPr lang="pt-BR" smtClean="0"/>
-              <a:t>29/04/2020</a:t>
+              <a:t>02/05/2020</a:t>
             </a:fld>
             <a:endParaRPr lang="pt-BR"/>
           </a:p>
@@ -2524,7 +2524,7 @@
           <a:p>
             <a:fld id="{4DBD1E3A-4E22-4317-B6F0-1BA28CFB09D2}" type="datetimeFigureOut">
               <a:rPr lang="pt-BR" smtClean="0"/>
-              <a:t>29/04/2020</a:t>
+              <a:t>02/05/2020</a:t>
             </a:fld>
             <a:endParaRPr lang="pt-BR"/>
           </a:p>
@@ -2781,7 +2781,7 @@
           <a:p>
             <a:fld id="{4DBD1E3A-4E22-4317-B6F0-1BA28CFB09D2}" type="datetimeFigureOut">
               <a:rPr lang="pt-BR" smtClean="0"/>
-              <a:t>29/04/2020</a:t>
+              <a:t>02/05/2020</a:t>
             </a:fld>
             <a:endParaRPr lang="pt-BR"/>
           </a:p>
@@ -2951,7 +2951,7 @@
           <a:p>
             <a:fld id="{4DBD1E3A-4E22-4317-B6F0-1BA28CFB09D2}" type="datetimeFigureOut">
               <a:rPr lang="pt-BR" smtClean="0"/>
-              <a:t>29/04/2020</a:t>
+              <a:t>02/05/2020</a:t>
             </a:fld>
             <a:endParaRPr lang="pt-BR"/>
           </a:p>
@@ -3131,7 +3131,7 @@
           <a:p>
             <a:fld id="{4DBD1E3A-4E22-4317-B6F0-1BA28CFB09D2}" type="datetimeFigureOut">
               <a:rPr lang="pt-BR" smtClean="0"/>
-              <a:t>29/04/2020</a:t>
+              <a:t>02/05/2020</a:t>
             </a:fld>
             <a:endParaRPr lang="pt-BR"/>
           </a:p>
@@ -3372,7 +3372,7 @@
                 <a:tabLst/>
                 <a:defRPr/>
               </a:pPr>
-              <a:t>29/04/2020</a:t>
+              <a:t>02/05/2020</a:t>
             </a:fld>
             <a:endParaRPr kumimoji="0" lang="pt-BR" sz="1200" b="0" i="0" u="none" strike="noStrike" kern="1200" cap="none" spc="0" normalizeH="0" baseline="0" noProof="0" smtClean="0">
               <a:ln>
@@ -3702,7 +3702,7 @@
                 <a:tabLst/>
                 <a:defRPr/>
               </a:pPr>
-              <a:t>29/04/2020</a:t>
+              <a:t>02/05/2020</a:t>
             </a:fld>
             <a:endParaRPr kumimoji="0" lang="pt-BR" sz="1200" b="0" i="0" u="none" strike="noStrike" kern="1200" cap="none" spc="0" normalizeH="0" baseline="0" noProof="0" smtClean="0">
               <a:ln>
@@ -4108,7 +4108,7 @@
                 <a:tabLst/>
                 <a:defRPr/>
               </a:pPr>
-              <a:t>29/04/2020</a:t>
+              <a:t>02/05/2020</a:t>
             </a:fld>
             <a:endParaRPr kumimoji="0" lang="pt-BR" sz="1200" b="0" i="0" u="none" strike="noStrike" kern="1200" cap="none" spc="0" normalizeH="0" baseline="0" noProof="0" smtClean="0">
               <a:ln>
@@ -4500,7 +4500,7 @@
                 <a:tabLst/>
                 <a:defRPr/>
               </a:pPr>
-              <a:t>29/04/2020</a:t>
+              <a:t>02/05/2020</a:t>
             </a:fld>
             <a:endParaRPr kumimoji="0" lang="pt-BR" sz="1200" b="0" i="0" u="none" strike="noStrike" kern="1200" cap="none" spc="0" normalizeH="0" baseline="0" noProof="0" smtClean="0">
               <a:ln>
@@ -5027,7 +5027,7 @@
                 <a:tabLst/>
                 <a:defRPr/>
               </a:pPr>
-              <a:t>29/04/2020</a:t>
+              <a:t>02/05/2020</a:t>
             </a:fld>
             <a:endParaRPr kumimoji="0" lang="pt-BR" sz="1200" b="0" i="0" u="none" strike="noStrike" kern="1200" cap="none" spc="0" normalizeH="0" baseline="0" noProof="0" smtClean="0">
               <a:ln>
@@ -5305,7 +5305,7 @@
                 <a:tabLst/>
                 <a:defRPr/>
               </a:pPr>
-              <a:t>29/04/2020</a:t>
+              <a:t>02/05/2020</a:t>
             </a:fld>
             <a:endParaRPr kumimoji="0" lang="pt-BR" sz="1200" b="0" i="0" u="none" strike="noStrike" kern="1200" cap="none" spc="0" normalizeH="0" baseline="0" noProof="0" smtClean="0">
               <a:ln>
@@ -5560,7 +5560,7 @@
                 <a:tabLst/>
                 <a:defRPr/>
               </a:pPr>
-              <a:t>29/04/2020</a:t>
+              <a:t>02/05/2020</a:t>
             </a:fld>
             <a:endParaRPr kumimoji="0" lang="pt-BR" sz="1200" b="0" i="0" u="none" strike="noStrike" kern="1200" cap="none" spc="0" normalizeH="0" baseline="0" noProof="0" smtClean="0">
               <a:ln>
@@ -5917,7 +5917,7 @@
           <a:p>
             <a:fld id="{4DBD1E3A-4E22-4317-B6F0-1BA28CFB09D2}" type="datetimeFigureOut">
               <a:rPr lang="pt-BR" smtClean="0"/>
-              <a:t>29/04/2020</a:t>
+              <a:t>02/05/2020</a:t>
             </a:fld>
             <a:endParaRPr lang="pt-BR"/>
           </a:p>
@@ -6243,7 +6243,7 @@
                 <a:tabLst/>
                 <a:defRPr/>
               </a:pPr>
-              <a:t>29/04/2020</a:t>
+              <a:t>02/05/2020</a:t>
             </a:fld>
             <a:endParaRPr kumimoji="0" lang="pt-BR" sz="1200" b="0" i="0" u="none" strike="noStrike" kern="1200" cap="none" spc="0" normalizeH="0" baseline="0" noProof="0" smtClean="0">
               <a:ln>
@@ -6656,7 +6656,7 @@
                 <a:tabLst/>
                 <a:defRPr/>
               </a:pPr>
-              <a:t>29/04/2020</a:t>
+              <a:t>02/05/2020</a:t>
             </a:fld>
             <a:endParaRPr kumimoji="0" lang="pt-BR" sz="1200" b="0" i="0" u="none" strike="noStrike" kern="1200" cap="none" spc="0" normalizeH="0" baseline="0" noProof="0" smtClean="0">
               <a:ln>
@@ -6986,7 +6986,7 @@
                 <a:tabLst/>
                 <a:defRPr/>
               </a:pPr>
-              <a:t>29/04/2020</a:t>
+              <a:t>02/05/2020</a:t>
             </a:fld>
             <a:endParaRPr kumimoji="0" lang="pt-BR" sz="1200" b="0" i="0" u="none" strike="noStrike" kern="1200" cap="none" spc="0" normalizeH="0" baseline="0" noProof="0" smtClean="0">
               <a:ln>
@@ -7326,7 +7326,7 @@
                 <a:tabLst/>
                 <a:defRPr/>
               </a:pPr>
-              <a:t>29/04/2020</a:t>
+              <a:t>02/05/2020</a:t>
             </a:fld>
             <a:endParaRPr kumimoji="0" lang="pt-BR" sz="1200" b="0" i="0" u="none" strike="noStrike" kern="1200" cap="none" spc="0" normalizeH="0" baseline="0" noProof="0" smtClean="0">
               <a:ln>
@@ -7678,7 +7678,7 @@
                 <a:tabLst/>
                 <a:defRPr/>
               </a:pPr>
-              <a:t>29/04/2020</a:t>
+              <a:t>02/05/2020</a:t>
             </a:fld>
             <a:endParaRPr kumimoji="0" lang="pt-BR" sz="1200" b="0" i="0" u="none" strike="noStrike" kern="1200" cap="none" spc="0" normalizeH="0" baseline="0" noProof="0">
               <a:ln>
@@ -8008,7 +8008,7 @@
                 <a:tabLst/>
                 <a:defRPr/>
               </a:pPr>
-              <a:t>29/04/2020</a:t>
+              <a:t>02/05/2020</a:t>
             </a:fld>
             <a:endParaRPr kumimoji="0" lang="pt-BR" sz="1200" b="0" i="0" u="none" strike="noStrike" kern="1200" cap="none" spc="0" normalizeH="0" baseline="0" noProof="0">
               <a:ln>
@@ -8414,7 +8414,7 @@
                 <a:tabLst/>
                 <a:defRPr/>
               </a:pPr>
-              <a:t>29/04/2020</a:t>
+              <a:t>02/05/2020</a:t>
             </a:fld>
             <a:endParaRPr kumimoji="0" lang="pt-BR" sz="1200" b="0" i="0" u="none" strike="noStrike" kern="1200" cap="none" spc="0" normalizeH="0" baseline="0" noProof="0">
               <a:ln>
@@ -8806,7 +8806,7 @@
                 <a:tabLst/>
                 <a:defRPr/>
               </a:pPr>
-              <a:t>29/04/2020</a:t>
+              <a:t>02/05/2020</a:t>
             </a:fld>
             <a:endParaRPr kumimoji="0" lang="pt-BR" sz="1200" b="0" i="0" u="none" strike="noStrike" kern="1200" cap="none" spc="0" normalizeH="0" baseline="0" noProof="0">
               <a:ln>
@@ -9333,7 +9333,7 @@
                 <a:tabLst/>
                 <a:defRPr/>
               </a:pPr>
-              <a:t>29/04/2020</a:t>
+              <a:t>02/05/2020</a:t>
             </a:fld>
             <a:endParaRPr kumimoji="0" lang="pt-BR" sz="1200" b="0" i="0" u="none" strike="noStrike" kern="1200" cap="none" spc="0" normalizeH="0" baseline="0" noProof="0">
               <a:ln>
@@ -9611,7 +9611,7 @@
                 <a:tabLst/>
                 <a:defRPr/>
               </a:pPr>
-              <a:t>29/04/2020</a:t>
+              <a:t>02/05/2020</a:t>
             </a:fld>
             <a:endParaRPr kumimoji="0" lang="pt-BR" sz="1200" b="0" i="0" u="none" strike="noStrike" kern="1200" cap="none" spc="0" normalizeH="0" baseline="0" noProof="0">
               <a:ln>
@@ -9954,7 +9954,7 @@
           <a:p>
             <a:fld id="{4DBD1E3A-4E22-4317-B6F0-1BA28CFB09D2}" type="datetimeFigureOut">
               <a:rPr lang="pt-BR" smtClean="0"/>
-              <a:t>29/04/2020</a:t>
+              <a:t>02/05/2020</a:t>
             </a:fld>
             <a:endParaRPr lang="pt-BR"/>
           </a:p>
@@ -10098,7 +10098,7 @@
                 <a:tabLst/>
                 <a:defRPr/>
               </a:pPr>
-              <a:t>29/04/2020</a:t>
+              <a:t>02/05/2020</a:t>
             </a:fld>
             <a:endParaRPr kumimoji="0" lang="pt-BR" sz="1200" b="0" i="0" u="none" strike="noStrike" kern="1200" cap="none" spc="0" normalizeH="0" baseline="0" noProof="0">
               <a:ln>
@@ -10535,7 +10535,7 @@
                 <a:tabLst/>
                 <a:defRPr/>
               </a:pPr>
-              <a:t>29/04/2020</a:t>
+              <a:t>02/05/2020</a:t>
             </a:fld>
             <a:endParaRPr kumimoji="0" lang="pt-BR" sz="1200" b="0" i="0" u="none" strike="noStrike" kern="1200" cap="none" spc="0" normalizeH="0" baseline="0" noProof="0">
               <a:ln>
@@ -10952,7 +10952,7 @@
                 <a:tabLst/>
                 <a:defRPr/>
               </a:pPr>
-              <a:t>29/04/2020</a:t>
+              <a:t>02/05/2020</a:t>
             </a:fld>
             <a:endParaRPr kumimoji="0" lang="pt-BR" sz="1200" b="0" i="0" u="none" strike="noStrike" kern="1200" cap="none" spc="0" normalizeH="0" baseline="0" noProof="0">
               <a:ln>
@@ -11282,7 +11282,7 @@
                 <a:tabLst/>
                 <a:defRPr/>
               </a:pPr>
-              <a:t>29/04/2020</a:t>
+              <a:t>02/05/2020</a:t>
             </a:fld>
             <a:endParaRPr kumimoji="0" lang="pt-BR" sz="1200" b="0" i="0" u="none" strike="noStrike" kern="1200" cap="none" spc="0" normalizeH="0" baseline="0" noProof="0">
               <a:ln>
@@ -11622,7 +11622,7 @@
                 <a:tabLst/>
                 <a:defRPr/>
               </a:pPr>
-              <a:t>29/04/2020</a:t>
+              <a:t>02/05/2020</a:t>
             </a:fld>
             <a:endParaRPr kumimoji="0" lang="pt-BR" sz="1200" b="0" i="0" u="none" strike="noStrike" kern="1200" cap="none" spc="0" normalizeH="0" baseline="0" noProof="0">
               <a:ln>
@@ -11974,7 +11974,7 @@
                 <a:tabLst/>
                 <a:defRPr/>
               </a:pPr>
-              <a:t>29/04/2020</a:t>
+              <a:t>02/05/2020</a:t>
             </a:fld>
             <a:endParaRPr kumimoji="0" lang="pt-BR" sz="1200" b="0" i="0" u="none" strike="noStrike" kern="1200" cap="none" spc="0" normalizeH="0" baseline="0" noProof="0">
               <a:ln>
@@ -12304,7 +12304,7 @@
                 <a:tabLst/>
                 <a:defRPr/>
               </a:pPr>
-              <a:t>29/04/2020</a:t>
+              <a:t>02/05/2020</a:t>
             </a:fld>
             <a:endParaRPr kumimoji="0" lang="pt-BR" sz="1200" b="0" i="0" u="none" strike="noStrike" kern="1200" cap="none" spc="0" normalizeH="0" baseline="0" noProof="0">
               <a:ln>
@@ -12710,7 +12710,7 @@
                 <a:tabLst/>
                 <a:defRPr/>
               </a:pPr>
-              <a:t>29/04/2020</a:t>
+              <a:t>02/05/2020</a:t>
             </a:fld>
             <a:endParaRPr kumimoji="0" lang="pt-BR" sz="1200" b="0" i="0" u="none" strike="noStrike" kern="1200" cap="none" spc="0" normalizeH="0" baseline="0" noProof="0">
               <a:ln>
@@ -13102,7 +13102,7 @@
                 <a:tabLst/>
                 <a:defRPr/>
               </a:pPr>
-              <a:t>29/04/2020</a:t>
+              <a:t>02/05/2020</a:t>
             </a:fld>
             <a:endParaRPr kumimoji="0" lang="pt-BR" sz="1200" b="0" i="0" u="none" strike="noStrike" kern="1200" cap="none" spc="0" normalizeH="0" baseline="0" noProof="0">
               <a:ln>
@@ -13629,7 +13629,7 @@
                 <a:tabLst/>
                 <a:defRPr/>
               </a:pPr>
-              <a:t>29/04/2020</a:t>
+              <a:t>02/05/2020</a:t>
             </a:fld>
             <a:endParaRPr kumimoji="0" lang="pt-BR" sz="1200" b="0" i="0" u="none" strike="noStrike" kern="1200" cap="none" spc="0" normalizeH="0" baseline="0" noProof="0">
               <a:ln>
@@ -14107,7 +14107,7 @@
           <a:p>
             <a:fld id="{4DBD1E3A-4E22-4317-B6F0-1BA28CFB09D2}" type="datetimeFigureOut">
               <a:rPr lang="pt-BR" smtClean="0"/>
-              <a:t>29/04/2020</a:t>
+              <a:t>02/05/2020</a:t>
             </a:fld>
             <a:endParaRPr lang="pt-BR"/>
           </a:p>
@@ -14274,7 +14274,7 @@
                 <a:tabLst/>
                 <a:defRPr/>
               </a:pPr>
-              <a:t>29/04/2020</a:t>
+              <a:t>02/05/2020</a:t>
             </a:fld>
             <a:endParaRPr kumimoji="0" lang="pt-BR" sz="1200" b="0" i="0" u="none" strike="noStrike" kern="1200" cap="none" spc="0" normalizeH="0" baseline="0" noProof="0">
               <a:ln>
@@ -14529,7 +14529,7 @@
                 <a:tabLst/>
                 <a:defRPr/>
               </a:pPr>
-              <a:t>29/04/2020</a:t>
+              <a:t>02/05/2020</a:t>
             </a:fld>
             <a:endParaRPr kumimoji="0" lang="pt-BR" sz="1200" b="0" i="0" u="none" strike="noStrike" kern="1200" cap="none" spc="0" normalizeH="0" baseline="0" noProof="0">
               <a:ln>
@@ -14966,7 +14966,7 @@
                 <a:tabLst/>
                 <a:defRPr/>
               </a:pPr>
-              <a:t>29/04/2020</a:t>
+              <a:t>02/05/2020</a:t>
             </a:fld>
             <a:endParaRPr kumimoji="0" lang="pt-BR" sz="1200" b="0" i="0" u="none" strike="noStrike" kern="1200" cap="none" spc="0" normalizeH="0" baseline="0" noProof="0">
               <a:ln>
@@ -15383,7 +15383,7 @@
                 <a:tabLst/>
                 <a:defRPr/>
               </a:pPr>
-              <a:t>29/04/2020</a:t>
+              <a:t>02/05/2020</a:t>
             </a:fld>
             <a:endParaRPr kumimoji="0" lang="pt-BR" sz="1200" b="0" i="0" u="none" strike="noStrike" kern="1200" cap="none" spc="0" normalizeH="0" baseline="0" noProof="0">
               <a:ln>
@@ -15713,7 +15713,7 @@
                 <a:tabLst/>
                 <a:defRPr/>
               </a:pPr>
-              <a:t>29/04/2020</a:t>
+              <a:t>02/05/2020</a:t>
             </a:fld>
             <a:endParaRPr kumimoji="0" lang="pt-BR" sz="1200" b="0" i="0" u="none" strike="noStrike" kern="1200" cap="none" spc="0" normalizeH="0" baseline="0" noProof="0">
               <a:ln>
@@ -16053,7 +16053,7 @@
                 <a:tabLst/>
                 <a:defRPr/>
               </a:pPr>
-              <a:t>29/04/2020</a:t>
+              <a:t>02/05/2020</a:t>
             </a:fld>
             <a:endParaRPr kumimoji="0" lang="pt-BR" sz="1200" b="0" i="0" u="none" strike="noStrike" kern="1200" cap="none" spc="0" normalizeH="0" baseline="0" noProof="0">
               <a:ln>
@@ -16405,7 +16405,7 @@
                 <a:tabLst/>
                 <a:defRPr/>
               </a:pPr>
-              <a:t>29/04/2020</a:t>
+              <a:t>02/05/2020</a:t>
             </a:fld>
             <a:endParaRPr kumimoji="0" lang="pt-BR" sz="1200" b="0" i="0" u="none" strike="noStrike" kern="1200" cap="none" spc="0" normalizeH="0" baseline="0" noProof="0" smtClean="0">
               <a:ln>
@@ -16735,7 +16735,7 @@
                 <a:tabLst/>
                 <a:defRPr/>
               </a:pPr>
-              <a:t>29/04/2020</a:t>
+              <a:t>02/05/2020</a:t>
             </a:fld>
             <a:endParaRPr kumimoji="0" lang="pt-BR" sz="1200" b="0" i="0" u="none" strike="noStrike" kern="1200" cap="none" spc="0" normalizeH="0" baseline="0" noProof="0" smtClean="0">
               <a:ln>
@@ -17141,7 +17141,7 @@
                 <a:tabLst/>
                 <a:defRPr/>
               </a:pPr>
-              <a:t>29/04/2020</a:t>
+              <a:t>02/05/2020</a:t>
             </a:fld>
             <a:endParaRPr kumimoji="0" lang="pt-BR" sz="1200" b="0" i="0" u="none" strike="noStrike" kern="1200" cap="none" spc="0" normalizeH="0" baseline="0" noProof="0" smtClean="0">
               <a:ln>
@@ -17533,7 +17533,7 @@
                 <a:tabLst/>
                 <a:defRPr/>
               </a:pPr>
-              <a:t>29/04/2020</a:t>
+              <a:t>02/05/2020</a:t>
             </a:fld>
             <a:endParaRPr kumimoji="0" lang="pt-BR" sz="1200" b="0" i="0" u="none" strike="noStrike" kern="1200" cap="none" spc="0" normalizeH="0" baseline="0" noProof="0" smtClean="0">
               <a:ln>
@@ -17762,7 +17762,7 @@
           <a:p>
             <a:fld id="{4DBD1E3A-4E22-4317-B6F0-1BA28CFB09D2}" type="datetimeFigureOut">
               <a:rPr lang="pt-BR" smtClean="0"/>
-              <a:t>29/04/2020</a:t>
+              <a:t>02/05/2020</a:t>
             </a:fld>
             <a:endParaRPr lang="pt-BR"/>
           </a:p>
@@ -18178,7 +18178,7 @@
                 <a:tabLst/>
                 <a:defRPr/>
               </a:pPr>
-              <a:t>29/04/2020</a:t>
+              <a:t>02/05/2020</a:t>
             </a:fld>
             <a:endParaRPr kumimoji="0" lang="pt-BR" sz="1200" b="0" i="0" u="none" strike="noStrike" kern="1200" cap="none" spc="0" normalizeH="0" baseline="0" noProof="0" smtClean="0">
               <a:ln>
@@ -18456,7 +18456,7 @@
                 <a:tabLst/>
                 <a:defRPr/>
               </a:pPr>
-              <a:t>29/04/2020</a:t>
+              <a:t>02/05/2020</a:t>
             </a:fld>
             <a:endParaRPr kumimoji="0" lang="pt-BR" sz="1200" b="0" i="0" u="none" strike="noStrike" kern="1200" cap="none" spc="0" normalizeH="0" baseline="0" noProof="0" smtClean="0">
               <a:ln>
@@ -18711,7 +18711,7 @@
                 <a:tabLst/>
                 <a:defRPr/>
               </a:pPr>
-              <a:t>29/04/2020</a:t>
+              <a:t>02/05/2020</a:t>
             </a:fld>
             <a:endParaRPr kumimoji="0" lang="pt-BR" sz="1200" b="0" i="0" u="none" strike="noStrike" kern="1200" cap="none" spc="0" normalizeH="0" baseline="0" noProof="0" smtClean="0">
               <a:ln>
@@ -19148,7 +19148,7 @@
                 <a:tabLst/>
                 <a:defRPr/>
               </a:pPr>
-              <a:t>29/04/2020</a:t>
+              <a:t>02/05/2020</a:t>
             </a:fld>
             <a:endParaRPr kumimoji="0" lang="pt-BR" sz="1200" b="0" i="0" u="none" strike="noStrike" kern="1200" cap="none" spc="0" normalizeH="0" baseline="0" noProof="0" smtClean="0">
               <a:ln>
@@ -19561,7 +19561,7 @@
                 <a:tabLst/>
                 <a:defRPr/>
               </a:pPr>
-              <a:t>29/04/2020</a:t>
+              <a:t>02/05/2020</a:t>
             </a:fld>
             <a:endParaRPr kumimoji="0" lang="pt-BR" sz="1200" b="0" i="0" u="none" strike="noStrike" kern="1200" cap="none" spc="0" normalizeH="0" baseline="0" noProof="0" smtClean="0">
               <a:ln>
@@ -19891,7 +19891,7 @@
                 <a:tabLst/>
                 <a:defRPr/>
               </a:pPr>
-              <a:t>29/04/2020</a:t>
+              <a:t>02/05/2020</a:t>
             </a:fld>
             <a:endParaRPr kumimoji="0" lang="pt-BR" sz="1200" b="0" i="0" u="none" strike="noStrike" kern="1200" cap="none" spc="0" normalizeH="0" baseline="0" noProof="0" smtClean="0">
               <a:ln>
@@ -20231,7 +20231,7 @@
                 <a:tabLst/>
                 <a:defRPr/>
               </a:pPr>
-              <a:t>29/04/2020</a:t>
+              <a:t>02/05/2020</a:t>
             </a:fld>
             <a:endParaRPr kumimoji="0" lang="pt-BR" sz="1200" b="0" i="0" u="none" strike="noStrike" kern="1200" cap="none" spc="0" normalizeH="0" baseline="0" noProof="0" smtClean="0">
               <a:ln>
@@ -20583,7 +20583,7 @@
                 <a:tabLst/>
                 <a:defRPr/>
               </a:pPr>
-              <a:t>29/04/2020</a:t>
+              <a:t>02/05/2020</a:t>
             </a:fld>
             <a:endParaRPr kumimoji="0" lang="pt-BR" sz="1200" b="0" i="0" u="none" strike="noStrike" kern="1200" cap="none" spc="0" normalizeH="0" baseline="0" noProof="0">
               <a:ln>
@@ -20913,7 +20913,7 @@
                 <a:tabLst/>
                 <a:defRPr/>
               </a:pPr>
-              <a:t>29/04/2020</a:t>
+              <a:t>02/05/2020</a:t>
             </a:fld>
             <a:endParaRPr kumimoji="0" lang="pt-BR" sz="1200" b="0" i="0" u="none" strike="noStrike" kern="1200" cap="none" spc="0" normalizeH="0" baseline="0" noProof="0">
               <a:ln>
@@ -21319,7 +21319,7 @@
                 <a:tabLst/>
                 <a:defRPr/>
               </a:pPr>
-              <a:t>29/04/2020</a:t>
+              <a:t>02/05/2020</a:t>
             </a:fld>
             <a:endParaRPr kumimoji="0" lang="pt-BR" sz="1200" b="0" i="0" u="none" strike="noStrike" kern="1200" cap="none" spc="0" normalizeH="0" baseline="0" noProof="0">
               <a:ln>
@@ -21525,7 +21525,7 @@
           <a:p>
             <a:fld id="{4DBD1E3A-4E22-4317-B6F0-1BA28CFB09D2}" type="datetimeFigureOut">
               <a:rPr lang="pt-BR" smtClean="0"/>
-              <a:t>29/04/2020</a:t>
+              <a:t>02/05/2020</a:t>
             </a:fld>
             <a:endParaRPr lang="pt-BR"/>
           </a:p>
@@ -21806,7 +21806,7 @@
                 <a:tabLst/>
                 <a:defRPr/>
               </a:pPr>
-              <a:t>29/04/2020</a:t>
+              <a:t>02/05/2020</a:t>
             </a:fld>
             <a:endParaRPr kumimoji="0" lang="pt-BR" sz="1200" b="0" i="0" u="none" strike="noStrike" kern="1200" cap="none" spc="0" normalizeH="0" baseline="0" noProof="0">
               <a:ln>
@@ -22333,7 +22333,7 @@
                 <a:tabLst/>
                 <a:defRPr/>
               </a:pPr>
-              <a:t>29/04/2020</a:t>
+              <a:t>02/05/2020</a:t>
             </a:fld>
             <a:endParaRPr kumimoji="0" lang="pt-BR" sz="1200" b="0" i="0" u="none" strike="noStrike" kern="1200" cap="none" spc="0" normalizeH="0" baseline="0" noProof="0">
               <a:ln>
@@ -22611,7 +22611,7 @@
                 <a:tabLst/>
                 <a:defRPr/>
               </a:pPr>
-              <a:t>29/04/2020</a:t>
+              <a:t>02/05/2020</a:t>
             </a:fld>
             <a:endParaRPr kumimoji="0" lang="pt-BR" sz="1200" b="0" i="0" u="none" strike="noStrike" kern="1200" cap="none" spc="0" normalizeH="0" baseline="0" noProof="0">
               <a:ln>
@@ -22866,7 +22866,7 @@
                 <a:tabLst/>
                 <a:defRPr/>
               </a:pPr>
-              <a:t>29/04/2020</a:t>
+              <a:t>02/05/2020</a:t>
             </a:fld>
             <a:endParaRPr kumimoji="0" lang="pt-BR" sz="1200" b="0" i="0" u="none" strike="noStrike" kern="1200" cap="none" spc="0" normalizeH="0" baseline="0" noProof="0">
               <a:ln>
@@ -23303,7 +23303,7 @@
                 <a:tabLst/>
                 <a:defRPr/>
               </a:pPr>
-              <a:t>29/04/2020</a:t>
+              <a:t>02/05/2020</a:t>
             </a:fld>
             <a:endParaRPr kumimoji="0" lang="pt-BR" sz="1200" b="0" i="0" u="none" strike="noStrike" kern="1200" cap="none" spc="0" normalizeH="0" baseline="0" noProof="0">
               <a:ln>
@@ -23720,7 +23720,7 @@
                 <a:tabLst/>
                 <a:defRPr/>
               </a:pPr>
-              <a:t>29/04/2020</a:t>
+              <a:t>02/05/2020</a:t>
             </a:fld>
             <a:endParaRPr kumimoji="0" lang="pt-BR" sz="1200" b="0" i="0" u="none" strike="noStrike" kern="1200" cap="none" spc="0" normalizeH="0" baseline="0" noProof="0">
               <a:ln>
@@ -24050,7 +24050,7 @@
                 <a:tabLst/>
                 <a:defRPr/>
               </a:pPr>
-              <a:t>29/04/2020</a:t>
+              <a:t>02/05/2020</a:t>
             </a:fld>
             <a:endParaRPr kumimoji="0" lang="pt-BR" sz="1200" b="0" i="0" u="none" strike="noStrike" kern="1200" cap="none" spc="0" normalizeH="0" baseline="0" noProof="0">
               <a:ln>
@@ -24390,7 +24390,7 @@
                 <a:tabLst/>
                 <a:defRPr/>
               </a:pPr>
-              <a:t>29/04/2020</a:t>
+              <a:t>02/05/2020</a:t>
             </a:fld>
             <a:endParaRPr kumimoji="0" lang="pt-BR" sz="1200" b="0" i="0" u="none" strike="noStrike" kern="1200" cap="none" spc="0" normalizeH="0" baseline="0" noProof="0">
               <a:ln>
@@ -24742,7 +24742,7 @@
                 <a:tabLst/>
                 <a:defRPr/>
               </a:pPr>
-              <a:t>29/04/2020</a:t>
+              <a:t>02/05/2020</a:t>
             </a:fld>
             <a:endParaRPr kumimoji="0" lang="pt-BR" sz="1200" b="0" i="0" u="none" strike="noStrike" kern="1200" cap="none" spc="0" normalizeH="0" baseline="0" noProof="0">
               <a:ln>
@@ -25072,7 +25072,7 @@
                 <a:tabLst/>
                 <a:defRPr/>
               </a:pPr>
-              <a:t>29/04/2020</a:t>
+              <a:t>02/05/2020</a:t>
             </a:fld>
             <a:endParaRPr kumimoji="0" lang="pt-BR" sz="1200" b="0" i="0" u="none" strike="noStrike" kern="1200" cap="none" spc="0" normalizeH="0" baseline="0" noProof="0">
               <a:ln>
@@ -25460,7 +25460,7 @@
           <a:p>
             <a:fld id="{4DBD1E3A-4E22-4317-B6F0-1BA28CFB09D2}" type="datetimeFigureOut">
               <a:rPr lang="pt-BR" smtClean="0"/>
-              <a:t>29/04/2020</a:t>
+              <a:t>02/05/2020</a:t>
             </a:fld>
             <a:endParaRPr lang="pt-BR"/>
           </a:p>
@@ -25755,7 +25755,7 @@
                 <a:tabLst/>
                 <a:defRPr/>
               </a:pPr>
-              <a:t>29/04/2020</a:t>
+              <a:t>02/05/2020</a:t>
             </a:fld>
             <a:endParaRPr kumimoji="0" lang="pt-BR" sz="1200" b="0" i="0" u="none" strike="noStrike" kern="1200" cap="none" spc="0" normalizeH="0" baseline="0" noProof="0">
               <a:ln>
@@ -26147,7 +26147,7 @@
                 <a:tabLst/>
                 <a:defRPr/>
               </a:pPr>
-              <a:t>29/04/2020</a:t>
+              <a:t>02/05/2020</a:t>
             </a:fld>
             <a:endParaRPr kumimoji="0" lang="pt-BR" sz="1200" b="0" i="0" u="none" strike="noStrike" kern="1200" cap="none" spc="0" normalizeH="0" baseline="0" noProof="0">
               <a:ln>
@@ -26674,7 +26674,7 @@
                 <a:tabLst/>
                 <a:defRPr/>
               </a:pPr>
-              <a:t>29/04/2020</a:t>
+              <a:t>02/05/2020</a:t>
             </a:fld>
             <a:endParaRPr kumimoji="0" lang="pt-BR" sz="1200" b="0" i="0" u="none" strike="noStrike" kern="1200" cap="none" spc="0" normalizeH="0" baseline="0" noProof="0">
               <a:ln>
@@ -26952,7 +26952,7 @@
                 <a:tabLst/>
                 <a:defRPr/>
               </a:pPr>
-              <a:t>29/04/2020</a:t>
+              <a:t>02/05/2020</a:t>
             </a:fld>
             <a:endParaRPr kumimoji="0" lang="pt-BR" sz="1200" b="0" i="0" u="none" strike="noStrike" kern="1200" cap="none" spc="0" normalizeH="0" baseline="0" noProof="0">
               <a:ln>
@@ -27207,7 +27207,7 @@
                 <a:tabLst/>
                 <a:defRPr/>
               </a:pPr>
-              <a:t>29/04/2020</a:t>
+              <a:t>02/05/2020</a:t>
             </a:fld>
             <a:endParaRPr kumimoji="0" lang="pt-BR" sz="1200" b="0" i="0" u="none" strike="noStrike" kern="1200" cap="none" spc="0" normalizeH="0" baseline="0" noProof="0">
               <a:ln>
@@ -27644,7 +27644,7 @@
                 <a:tabLst/>
                 <a:defRPr/>
               </a:pPr>
-              <a:t>29/04/2020</a:t>
+              <a:t>02/05/2020</a:t>
             </a:fld>
             <a:endParaRPr kumimoji="0" lang="pt-BR" sz="1200" b="0" i="0" u="none" strike="noStrike" kern="1200" cap="none" spc="0" normalizeH="0" baseline="0" noProof="0">
               <a:ln>
@@ -28061,7 +28061,7 @@
                 <a:tabLst/>
                 <a:defRPr/>
               </a:pPr>
-              <a:t>29/04/2020</a:t>
+              <a:t>02/05/2020</a:t>
             </a:fld>
             <a:endParaRPr kumimoji="0" lang="pt-BR" sz="1200" b="0" i="0" u="none" strike="noStrike" kern="1200" cap="none" spc="0" normalizeH="0" baseline="0" noProof="0">
               <a:ln>
@@ -28391,7 +28391,7 @@
                 <a:tabLst/>
                 <a:defRPr/>
               </a:pPr>
-              <a:t>29/04/2020</a:t>
+              <a:t>02/05/2020</a:t>
             </a:fld>
             <a:endParaRPr kumimoji="0" lang="pt-BR" sz="1200" b="0" i="0" u="none" strike="noStrike" kern="1200" cap="none" spc="0" normalizeH="0" baseline="0" noProof="0">
               <a:ln>
@@ -28731,7 +28731,7 @@
                 <a:tabLst/>
                 <a:defRPr/>
               </a:pPr>
-              <a:t>29/04/2020</a:t>
+              <a:t>02/05/2020</a:t>
             </a:fld>
             <a:endParaRPr kumimoji="0" lang="pt-BR" sz="1200" b="0" i="0" u="none" strike="noStrike" kern="1200" cap="none" spc="0" normalizeH="0" baseline="0" noProof="0">
               <a:ln>
@@ -29095,7 +29095,7 @@
           <a:p>
             <a:fld id="{4DBD1E3A-4E22-4317-B6F0-1BA28CFB09D2}" type="datetimeFigureOut">
               <a:rPr lang="pt-BR" smtClean="0"/>
-              <a:t>29/04/2020</a:t>
+              <a:t>02/05/2020</a:t>
             </a:fld>
             <a:endParaRPr lang="pt-BR"/>
           </a:p>
@@ -29308,7 +29308,7 @@
           <a:p>
             <a:fld id="{4DBD1E3A-4E22-4317-B6F0-1BA28CFB09D2}" type="datetimeFigureOut">
               <a:rPr lang="pt-BR" smtClean="0"/>
-              <a:t>29/04/2020</a:t>
+              <a:t>02/05/2020</a:t>
             </a:fld>
             <a:endParaRPr lang="pt-BR"/>
           </a:p>
@@ -29848,7 +29848,7 @@
           <a:p>
             <a:fld id="{4DBD1E3A-4E22-4317-B6F0-1BA28CFB09D2}" type="datetimeFigureOut">
               <a:rPr lang="pt-BR" smtClean="0"/>
-              <a:t>29/04/2020</a:t>
+              <a:t>02/05/2020</a:t>
             </a:fld>
             <a:endParaRPr lang="pt-BR"/>
           </a:p>
@@ -30437,7 +30437,7 @@
                 <a:tabLst/>
                 <a:defRPr/>
               </a:pPr>
-              <a:t>29/04/2020</a:t>
+              <a:t>02/05/2020</a:t>
             </a:fld>
             <a:endParaRPr kumimoji="0" lang="pt-BR" sz="1200" b="0" i="0" u="none" strike="noStrike" kern="1200" cap="none" spc="0" normalizeH="0" baseline="0" noProof="0" smtClean="0">
               <a:ln>
@@ -31137,7 +31137,7 @@
                 <a:tabLst/>
                 <a:defRPr/>
               </a:pPr>
-              <a:t>29/04/2020</a:t>
+              <a:t>02/05/2020</a:t>
             </a:fld>
             <a:endParaRPr kumimoji="0" lang="pt-BR" sz="1200" b="0" i="0" u="none" strike="noStrike" kern="1200" cap="none" spc="0" normalizeH="0" baseline="0" noProof="0">
               <a:ln>
@@ -31837,7 +31837,7 @@
                 <a:tabLst/>
                 <a:defRPr/>
               </a:pPr>
-              <a:t>29/04/2020</a:t>
+              <a:t>02/05/2020</a:t>
             </a:fld>
             <a:endParaRPr kumimoji="0" lang="pt-BR" sz="1200" b="0" i="0" u="none" strike="noStrike" kern="1200" cap="none" spc="0" normalizeH="0" baseline="0" noProof="0">
               <a:ln>
@@ -32537,7 +32537,7 @@
                 <a:tabLst/>
                 <a:defRPr/>
               </a:pPr>
-              <a:t>29/04/2020</a:t>
+              <a:t>02/05/2020</a:t>
             </a:fld>
             <a:endParaRPr kumimoji="0" lang="pt-BR" sz="1200" b="0" i="0" u="none" strike="noStrike" kern="1200" cap="none" spc="0" normalizeH="0" baseline="0" noProof="0" smtClean="0">
               <a:ln>
@@ -33237,7 +33237,7 @@
                 <a:tabLst/>
                 <a:defRPr/>
               </a:pPr>
-              <a:t>29/04/2020</a:t>
+              <a:t>02/05/2020</a:t>
             </a:fld>
             <a:endParaRPr kumimoji="0" lang="pt-BR" sz="1200" b="0" i="0" u="none" strike="noStrike" kern="1200" cap="none" spc="0" normalizeH="0" baseline="0" noProof="0">
               <a:ln>
@@ -33937,7 +33937,7 @@
                 <a:tabLst/>
                 <a:defRPr/>
               </a:pPr>
-              <a:t>29/04/2020</a:t>
+              <a:t>02/05/2020</a:t>
             </a:fld>
             <a:endParaRPr kumimoji="0" lang="pt-BR" sz="1200" b="0" i="0" u="none" strike="noStrike" kern="1200" cap="none" spc="0" normalizeH="0" baseline="0" noProof="0">
               <a:ln>
@@ -37164,7 +37164,7 @@
           <p:spPr>
             <a:xfrm>
               <a:off x="4753425" y="1144438"/>
-              <a:ext cx="634681" cy="268790"/>
+              <a:ext cx="711874" cy="268790"/>
             </a:xfrm>
             <a:prstGeom prst="rect">
               <a:avLst/>
@@ -37195,21 +37195,13 @@
                 <a:defRPr/>
               </a:pPr>
               <a:r>
-                <a:rPr kumimoji="0" lang="pt-BR" sz="1800" b="0" i="0" u="none" strike="noStrike" kern="1200" cap="none" spc="0" normalizeH="0" baseline="0" noProof="0" dirty="0" smtClean="0">
-                  <a:ln>
-                    <a:noFill/>
-                  </a:ln>
+                <a:rPr lang="pt-BR" dirty="0" smtClean="0">
                   <a:solidFill>
                     <a:prstClr val="black"/>
                   </a:solidFill>
-                  <a:effectLst/>
-                  <a:uLnTx/>
-                  <a:uFillTx/>
                   <a:latin typeface="Calibri" panose="020F0502020204030204"/>
-                  <a:ea typeface="+mn-ea"/>
-                  <a:cs typeface="+mn-cs"/>
                 </a:rPr>
-                <a:t>Caixa</a:t>
+                <a:t>Banco</a:t>
               </a:r>
               <a:endParaRPr kumimoji="0" lang="pt-BR" sz="1800" b="0" i="0" u="none" strike="noStrike" kern="1200" cap="none" spc="0" normalizeH="0" baseline="0" noProof="0" dirty="0">
                 <a:ln>
@@ -43261,7 +43253,7 @@
             <p:spPr>
               <a:xfrm>
                 <a:off x="4629612" y="1162388"/>
-                <a:ext cx="864042" cy="274391"/>
+                <a:ext cx="948025" cy="274391"/>
               </a:xfrm>
               <a:prstGeom prst="rect">
                 <a:avLst/>
@@ -43306,7 +43298,7 @@
                     <a:ea typeface="+mn-ea"/>
                     <a:cs typeface="+mn-cs"/>
                   </a:rPr>
-                  <a:t>Pedidos</a:t>
+                  <a:t>Compras</a:t>
                 </a:r>
                 <a:endParaRPr kumimoji="0" lang="pt-BR" sz="1800" b="0" i="0" u="none" strike="noStrike" kern="1200" cap="none" spc="0" normalizeH="0" baseline="0" noProof="0" dirty="0">
                   <a:ln>
@@ -43426,7 +43418,7 @@
             <p:spPr>
               <a:xfrm>
                 <a:off x="4680796" y="1159664"/>
-                <a:ext cx="634681" cy="268790"/>
+                <a:ext cx="711874" cy="268790"/>
               </a:xfrm>
               <a:prstGeom prst="rect">
                 <a:avLst/>
@@ -43471,7 +43463,7 @@
                     <a:ea typeface="+mn-ea"/>
                     <a:cs typeface="+mn-cs"/>
                   </a:rPr>
-                  <a:t>Caixa</a:t>
+                  <a:t>Banco</a:t>
                 </a:r>
                 <a:endParaRPr kumimoji="0" lang="pt-BR" sz="1800" b="0" i="0" u="none" strike="noStrike" kern="1200" cap="none" spc="0" normalizeH="0" baseline="0" noProof="0" dirty="0">
                   <a:ln>
@@ -45291,7 +45283,7 @@
           <p:spPr>
             <a:xfrm>
               <a:off x="4753425" y="1158233"/>
-              <a:ext cx="634681" cy="268790"/>
+              <a:ext cx="711874" cy="268790"/>
             </a:xfrm>
             <a:prstGeom prst="rect">
               <a:avLst/>
@@ -45336,7 +45328,7 @@
                   <a:ea typeface="+mn-ea"/>
                   <a:cs typeface="+mn-cs"/>
                 </a:rPr>
-                <a:t>Caixa</a:t>
+                <a:t>Banco</a:t>
               </a:r>
               <a:endParaRPr kumimoji="0" lang="pt-BR" sz="1800" b="0" i="0" u="none" strike="noStrike" kern="1200" cap="none" spc="0" normalizeH="0" baseline="0" noProof="0" dirty="0">
                 <a:ln>
@@ -47520,7 +47512,7 @@
     </a:clrScheme>
     <a:fontScheme name="Office">
       <a:majorFont>
-        <a:latin typeface="Calibri Light" panose="020F0302020204030204"/>
+        <a:latin typeface="Calibri Light"/>
         <a:ea typeface=""/>
         <a:cs typeface=""/>
         <a:font script="Jpan" typeface="游ゴシック Light"/>
@@ -47555,7 +47547,7 @@
         <a:font script="Geor" typeface="Sylfaen"/>
       </a:majorFont>
       <a:minorFont>
-        <a:latin typeface="Calibri" panose="020F0502020204030204"/>
+        <a:latin typeface="Calibri"/>
         <a:ea typeface=""/>
         <a:cs typeface=""/>
         <a:font script="Jpan" typeface="游ゴシック"/>
@@ -47732,7 +47724,7 @@
   <a:extraClrSchemeLst/>
   <a:extLst>
     <a:ext uri="{05A4C25C-085E-4340-85A3-A5531E510DB2}">
-      <thm15:themeFamily xmlns:thm15="http://schemas.microsoft.com/office/thememl/2012/main" name="Office Theme" id="{62F939B6-93AF-4DB8-9C6B-D6C7DFDC589F}" vid="{4A3C46E8-61CC-4603-A589-7422A47A8E4A}"/>
+      <thm15:themeFamily xmlns:thm15="http://schemas.microsoft.com/office/thememl/2012/main" xmlns="" name="Office Theme" id="{62F939B6-93AF-4DB8-9C6B-D6C7DFDC589F}" vid="{4A3C46E8-61CC-4603-A589-7422A47A8E4A}"/>
     </a:ext>
   </a:extLst>
 </a:theme>
@@ -47781,7 +47773,7 @@
     </a:clrScheme>
     <a:fontScheme name="Tema do Office">
       <a:majorFont>
-        <a:latin typeface="Calibri Light" panose="020F0302020204030204"/>
+        <a:latin typeface="Calibri Light"/>
         <a:ea typeface=""/>
         <a:cs typeface=""/>
         <a:font script="Jpan" typeface="游ゴシック Light"/>
@@ -47816,7 +47808,7 @@
         <a:font script="Geor" typeface="Sylfaen"/>
       </a:majorFont>
       <a:minorFont>
-        <a:latin typeface="Calibri" panose="020F0502020204030204"/>
+        <a:latin typeface="Calibri"/>
         <a:ea typeface=""/>
         <a:cs typeface=""/>
         <a:font script="Jpan" typeface="游ゴシック"/>
@@ -47993,7 +47985,7 @@
   <a:extraClrSchemeLst/>
   <a:extLst>
     <a:ext uri="{05A4C25C-085E-4340-85A3-A5531E510DB2}">
-      <thm15:themeFamily xmlns:thm15="http://schemas.microsoft.com/office/thememl/2012/main" name="Office Theme" id="{62F939B6-93AF-4DB8-9C6B-D6C7DFDC589F}" vid="{AE6F2518-B084-4896-AF52-66CC2144AA26}"/>
+      <thm15:themeFamily xmlns:thm15="http://schemas.microsoft.com/office/thememl/2012/main" xmlns="" name="Office Theme" id="{62F939B6-93AF-4DB8-9C6B-D6C7DFDC589F}" vid="{AE6F2518-B084-4896-AF52-66CC2144AA26}"/>
     </a:ext>
   </a:extLst>
 </a:theme>
@@ -48042,7 +48034,7 @@
     </a:clrScheme>
     <a:fontScheme name="Office">
       <a:majorFont>
-        <a:latin typeface="Calibri Light" panose="020F0302020204030204"/>
+        <a:latin typeface="Calibri Light"/>
         <a:ea typeface=""/>
         <a:cs typeface=""/>
         <a:font script="Jpan" typeface="游ゴシック Light"/>
@@ -48077,7 +48069,7 @@
         <a:font script="Geor" typeface="Sylfaen"/>
       </a:majorFont>
       <a:minorFont>
-        <a:latin typeface="Calibri" panose="020F0502020204030204"/>
+        <a:latin typeface="Calibri"/>
         <a:ea typeface=""/>
         <a:cs typeface=""/>
         <a:font script="Jpan" typeface="游ゴシック"/>
@@ -48254,7 +48246,7 @@
   <a:extraClrSchemeLst/>
   <a:extLst>
     <a:ext uri="{05A4C25C-085E-4340-85A3-A5531E510DB2}">
-      <thm15:themeFamily xmlns:thm15="http://schemas.microsoft.com/office/thememl/2012/main" name="Office Theme" id="{62F939B6-93AF-4DB8-9C6B-D6C7DFDC589F}" vid="{4A3C46E8-61CC-4603-A589-7422A47A8E4A}"/>
+      <thm15:themeFamily xmlns:thm15="http://schemas.microsoft.com/office/thememl/2012/main" xmlns="" name="Office Theme" id="{62F939B6-93AF-4DB8-9C6B-D6C7DFDC589F}" vid="{4A3C46E8-61CC-4603-A589-7422A47A8E4A}"/>
     </a:ext>
   </a:extLst>
 </a:theme>
@@ -48303,7 +48295,7 @@
     </a:clrScheme>
     <a:fontScheme name="Tema do Office">
       <a:majorFont>
-        <a:latin typeface="Calibri Light" panose="020F0302020204030204"/>
+        <a:latin typeface="Calibri Light"/>
         <a:ea typeface=""/>
         <a:cs typeface=""/>
         <a:font script="Jpan" typeface="游ゴシック Light"/>
@@ -48338,7 +48330,7 @@
         <a:font script="Geor" typeface="Sylfaen"/>
       </a:majorFont>
       <a:minorFont>
-        <a:latin typeface="Calibri" panose="020F0502020204030204"/>
+        <a:latin typeface="Calibri"/>
         <a:ea typeface=""/>
         <a:cs typeface=""/>
         <a:font script="Jpan" typeface="游ゴシック"/>
@@ -48515,7 +48507,7 @@
   <a:extraClrSchemeLst/>
   <a:extLst>
     <a:ext uri="{05A4C25C-085E-4340-85A3-A5531E510DB2}">
-      <thm15:themeFamily xmlns:thm15="http://schemas.microsoft.com/office/thememl/2012/main" name="Office Theme" id="{62F939B6-93AF-4DB8-9C6B-D6C7DFDC589F}" vid="{4A3C46E8-61CC-4603-A589-7422A47A8E4A}"/>
+      <thm15:themeFamily xmlns:thm15="http://schemas.microsoft.com/office/thememl/2012/main" xmlns="" name="Office Theme" id="{62F939B6-93AF-4DB8-9C6B-D6C7DFDC589F}" vid="{4A3C46E8-61CC-4603-A589-7422A47A8E4A}"/>
     </a:ext>
   </a:extLst>
 </a:theme>
@@ -48564,7 +48556,7 @@
     </a:clrScheme>
     <a:fontScheme name="Tema do Office">
       <a:majorFont>
-        <a:latin typeface="Calibri Light" panose="020F0302020204030204"/>
+        <a:latin typeface="Calibri Light"/>
         <a:ea typeface=""/>
         <a:cs typeface=""/>
         <a:font script="Jpan" typeface="游ゴシック Light"/>
@@ -48599,7 +48591,7 @@
         <a:font script="Geor" typeface="Sylfaen"/>
       </a:majorFont>
       <a:minorFont>
-        <a:latin typeface="Calibri" panose="020F0502020204030204"/>
+        <a:latin typeface="Calibri"/>
         <a:ea typeface=""/>
         <a:cs typeface=""/>
         <a:font script="Jpan" typeface="游ゴシック"/>
@@ -48776,7 +48768,7 @@
   <a:extraClrSchemeLst/>
   <a:extLst>
     <a:ext uri="{05A4C25C-085E-4340-85A3-A5531E510DB2}">
-      <thm15:themeFamily xmlns:thm15="http://schemas.microsoft.com/office/thememl/2012/main" name="Office Theme" id="{62F939B6-93AF-4DB8-9C6B-D6C7DFDC589F}" vid="{4A3C46E8-61CC-4603-A589-7422A47A8E4A}"/>
+      <thm15:themeFamily xmlns:thm15="http://schemas.microsoft.com/office/thememl/2012/main" xmlns="" name="Office Theme" id="{62F939B6-93AF-4DB8-9C6B-D6C7DFDC589F}" vid="{4A3C46E8-61CC-4603-A589-7422A47A8E4A}"/>
     </a:ext>
   </a:extLst>
 </a:theme>
@@ -48825,7 +48817,7 @@
     </a:clrScheme>
     <a:fontScheme name="Office">
       <a:majorFont>
-        <a:latin typeface="Calibri Light" panose="020F0302020204030204"/>
+        <a:latin typeface="Calibri Light"/>
         <a:ea typeface=""/>
         <a:cs typeface=""/>
         <a:font script="Jpan" typeface="游ゴシック Light"/>
@@ -48860,7 +48852,7 @@
         <a:font script="Geor" typeface="Sylfaen"/>
       </a:majorFont>
       <a:minorFont>
-        <a:latin typeface="Calibri" panose="020F0502020204030204"/>
+        <a:latin typeface="Calibri"/>
         <a:ea typeface=""/>
         <a:cs typeface=""/>
         <a:font script="Jpan" typeface="游ゴシック"/>
@@ -49037,7 +49029,7 @@
   <a:extraClrSchemeLst/>
   <a:extLst>
     <a:ext uri="{05A4C25C-085E-4340-85A3-A5531E510DB2}">
-      <thm15:themeFamily xmlns:thm15="http://schemas.microsoft.com/office/thememl/2012/main" name="Office Theme" id="{62F939B6-93AF-4DB8-9C6B-D6C7DFDC589F}" vid="{4A3C46E8-61CC-4603-A589-7422A47A8E4A}"/>
+      <thm15:themeFamily xmlns:thm15="http://schemas.microsoft.com/office/thememl/2012/main" xmlns="" name="Office Theme" id="{62F939B6-93AF-4DB8-9C6B-D6C7DFDC589F}" vid="{4A3C46E8-61CC-4603-A589-7422A47A8E4A}"/>
     </a:ext>
   </a:extLst>
 </a:theme>
@@ -49086,7 +49078,7 @@
     </a:clrScheme>
     <a:fontScheme name="Tema do Office">
       <a:majorFont>
-        <a:latin typeface="Calibri Light" panose="020F0302020204030204"/>
+        <a:latin typeface="Calibri Light"/>
         <a:ea typeface=""/>
         <a:cs typeface=""/>
         <a:font script="Jpan" typeface="游ゴシック Light"/>
@@ -49121,7 +49113,7 @@
         <a:font script="Geor" typeface="Sylfaen"/>
       </a:majorFont>
       <a:minorFont>
-        <a:latin typeface="Calibri" panose="020F0502020204030204"/>
+        <a:latin typeface="Calibri"/>
         <a:ea typeface=""/>
         <a:cs typeface=""/>
         <a:font script="Jpan" typeface="游ゴシック"/>
@@ -49298,7 +49290,7 @@
   <a:extraClrSchemeLst/>
   <a:extLst>
     <a:ext uri="{05A4C25C-085E-4340-85A3-A5531E510DB2}">
-      <thm15:themeFamily xmlns:thm15="http://schemas.microsoft.com/office/thememl/2012/main" name="Office Theme" id="{62F939B6-93AF-4DB8-9C6B-D6C7DFDC589F}" vid="{4A3C46E8-61CC-4603-A589-7422A47A8E4A}"/>
+      <thm15:themeFamily xmlns:thm15="http://schemas.microsoft.com/office/thememl/2012/main" xmlns="" name="Office Theme" id="{62F939B6-93AF-4DB8-9C6B-D6C7DFDC589F}" vid="{4A3C46E8-61CC-4603-A589-7422A47A8E4A}"/>
     </a:ext>
   </a:extLst>
 </a:theme>
@@ -49347,7 +49339,7 @@
     </a:clrScheme>
     <a:fontScheme name="Tema do Office">
       <a:majorFont>
-        <a:latin typeface="Calibri Light" panose="020F0302020204030204"/>
+        <a:latin typeface="Calibri Light"/>
         <a:ea typeface=""/>
         <a:cs typeface=""/>
         <a:font script="Jpan" typeface="游ゴシック Light"/>
@@ -49382,7 +49374,7 @@
         <a:font script="Geor" typeface="Sylfaen"/>
       </a:majorFont>
       <a:minorFont>
-        <a:latin typeface="Calibri" panose="020F0502020204030204"/>
+        <a:latin typeface="Calibri"/>
         <a:ea typeface=""/>
         <a:cs typeface=""/>
         <a:font script="Jpan" typeface="游ゴシック"/>
@@ -49559,7 +49551,7 @@
   <a:extraClrSchemeLst/>
   <a:extLst>
     <a:ext uri="{05A4C25C-085E-4340-85A3-A5531E510DB2}">
-      <thm15:themeFamily xmlns:thm15="http://schemas.microsoft.com/office/thememl/2012/main" name="Office Theme" id="{62F939B6-93AF-4DB8-9C6B-D6C7DFDC589F}" vid="{AE6F2518-B084-4896-AF52-66CC2144AA26}"/>
+      <thm15:themeFamily xmlns:thm15="http://schemas.microsoft.com/office/thememl/2012/main" xmlns="" name="Office Theme" id="{62F939B6-93AF-4DB8-9C6B-D6C7DFDC589F}" vid="{AE6F2518-B084-4896-AF52-66CC2144AA26}"/>
     </a:ext>
   </a:extLst>
 </a:theme>

</xml_diff>